<commit_message>
added red jamming icons
</commit_message>
<xml_diff>
--- a/shipIcon.pptx
+++ b/shipIcon.pptx
@@ -11,6 +11,9 @@
     <p:sldId id="261" r:id="rId5"/>
     <p:sldId id="264" r:id="rId6"/>
     <p:sldId id="265" r:id="rId7"/>
+    <p:sldId id="266" r:id="rId8"/>
+    <p:sldId id="267" r:id="rId9"/>
+    <p:sldId id="268" r:id="rId10"/>
   </p:sldIdLst>
   <p:sldSz cx="12192000" cy="6858000"/>
   <p:notesSz cx="6858000" cy="9144000"/>
@@ -109,6 +112,11 @@
       </a:defRPr>
     </a:lvl9pPr>
   </p:defaultTextStyle>
+  <p:extLst>
+    <p:ext uri="{EFAFB233-063F-42B5-8137-9DF3F51BA10A}">
+      <p15:sldGuideLst xmlns:p15="http://schemas.microsoft.com/office/powerpoint/2012/main"/>
+    </p:ext>
+  </p:extLst>
 </p:presentation>
 </file>
 
@@ -195,35 +203,35 @@
               <a:buNone/>
               <a:defRPr sz="2400"/>
             </a:lvl1pPr>
-            <a:lvl2pPr marL="457200" indent="0" algn="ctr">
+            <a:lvl2pPr marL="457218" indent="0" algn="ctr">
               <a:buNone/>
               <a:defRPr sz="2000"/>
             </a:lvl2pPr>
-            <a:lvl3pPr marL="914400" indent="0" algn="ctr">
+            <a:lvl3pPr marL="914435" indent="0" algn="ctr">
               <a:buNone/>
-              <a:defRPr sz="1800"/>
+              <a:defRPr sz="1801"/>
             </a:lvl3pPr>
-            <a:lvl4pPr marL="1371600" indent="0" algn="ctr">
+            <a:lvl4pPr marL="1371651" indent="0" algn="ctr">
               <a:buNone/>
               <a:defRPr sz="1600"/>
             </a:lvl4pPr>
-            <a:lvl5pPr marL="1828800" indent="0" algn="ctr">
+            <a:lvl5pPr marL="1828869" indent="0" algn="ctr">
               <a:buNone/>
               <a:defRPr sz="1600"/>
             </a:lvl5pPr>
-            <a:lvl6pPr marL="2286000" indent="0" algn="ctr">
+            <a:lvl6pPr marL="2286085" indent="0" algn="ctr">
               <a:buNone/>
               <a:defRPr sz="1600"/>
             </a:lvl6pPr>
-            <a:lvl7pPr marL="2743200" indent="0" algn="ctr">
+            <a:lvl7pPr marL="2743302" indent="0" algn="ctr">
               <a:buNone/>
               <a:defRPr sz="1600"/>
             </a:lvl7pPr>
-            <a:lvl8pPr marL="3200400" indent="0" algn="ctr">
+            <a:lvl8pPr marL="3200520" indent="0" algn="ctr">
               <a:buNone/>
               <a:defRPr sz="1600"/>
             </a:lvl8pPr>
-            <a:lvl9pPr marL="3657600" indent="0" algn="ctr">
+            <a:lvl9pPr marL="3657738" indent="0" algn="ctr">
               <a:buNone/>
               <a:defRPr sz="1600"/>
             </a:lvl9pPr>
@@ -565,7 +573,7 @@
         </p:nvSpPr>
         <p:spPr>
           <a:xfrm>
-            <a:off x="8724900" y="365125"/>
+            <a:off x="8724899" y="365125"/>
             <a:ext cx="2628900" cy="5811838"/>
           </a:xfrm>
         </p:spPr>
@@ -598,7 +606,7 @@
         </p:nvSpPr>
         <p:spPr>
           <a:xfrm>
-            <a:off x="838200" y="365125"/>
+            <a:off x="838199" y="365125"/>
             <a:ext cx="7734300" cy="5811838"/>
           </a:xfrm>
         </p:spPr>
@@ -971,7 +979,7 @@
         </p:nvSpPr>
         <p:spPr>
           <a:xfrm>
-            <a:off x="831850" y="1709738"/>
+            <a:off x="831853" y="1709738"/>
             <a:ext cx="10515600" cy="2852737"/>
           </a:xfrm>
         </p:spPr>
@@ -1008,7 +1016,7 @@
         </p:nvSpPr>
         <p:spPr>
           <a:xfrm>
-            <a:off x="831850" y="4589463"/>
+            <a:off x="831853" y="4589466"/>
             <a:ext cx="10515600" cy="1500187"/>
           </a:xfrm>
         </p:spPr>
@@ -1025,7 +1033,7 @@
                 </a:solidFill>
               </a:defRPr>
             </a:lvl1pPr>
-            <a:lvl2pPr marL="457200" indent="0">
+            <a:lvl2pPr marL="457218" indent="0">
               <a:buNone/>
               <a:defRPr sz="2000">
                 <a:solidFill>
@@ -1035,9 +1043,9 @@
                 </a:solidFill>
               </a:defRPr>
             </a:lvl2pPr>
-            <a:lvl3pPr marL="914400" indent="0">
+            <a:lvl3pPr marL="914435" indent="0">
               <a:buNone/>
-              <a:defRPr sz="1800">
+              <a:defRPr sz="1801">
                 <a:solidFill>
                   <a:schemeClr val="tx1">
                     <a:tint val="75000"/>
@@ -1045,7 +1053,7 @@
                 </a:solidFill>
               </a:defRPr>
             </a:lvl3pPr>
-            <a:lvl4pPr marL="1371600" indent="0">
+            <a:lvl4pPr marL="1371651" indent="0">
               <a:buNone/>
               <a:defRPr sz="1600">
                 <a:solidFill>
@@ -1055,7 +1063,7 @@
                 </a:solidFill>
               </a:defRPr>
             </a:lvl4pPr>
-            <a:lvl5pPr marL="1828800" indent="0">
+            <a:lvl5pPr marL="1828869" indent="0">
               <a:buNone/>
               <a:defRPr sz="1600">
                 <a:solidFill>
@@ -1065,7 +1073,7 @@
                 </a:solidFill>
               </a:defRPr>
             </a:lvl5pPr>
-            <a:lvl6pPr marL="2286000" indent="0">
+            <a:lvl6pPr marL="2286085" indent="0">
               <a:buNone/>
               <a:defRPr sz="1600">
                 <a:solidFill>
@@ -1075,7 +1083,7 @@
                 </a:solidFill>
               </a:defRPr>
             </a:lvl6pPr>
-            <a:lvl7pPr marL="2743200" indent="0">
+            <a:lvl7pPr marL="2743302" indent="0">
               <a:buNone/>
               <a:defRPr sz="1600">
                 <a:solidFill>
@@ -1085,7 +1093,7 @@
                 </a:solidFill>
               </a:defRPr>
             </a:lvl7pPr>
-            <a:lvl8pPr marL="3200400" indent="0">
+            <a:lvl8pPr marL="3200520" indent="0">
               <a:buNone/>
               <a:defRPr sz="1600">
                 <a:solidFill>
@@ -1095,7 +1103,7 @@
                 </a:solidFill>
               </a:defRPr>
             </a:lvl8pPr>
-            <a:lvl9pPr marL="3657600" indent="0">
+            <a:lvl9pPr marL="3657738" indent="0">
               <a:buNone/>
               <a:defRPr sz="1600">
                 <a:solidFill>
@@ -1274,7 +1282,7 @@
         </p:nvSpPr>
         <p:spPr>
           <a:xfrm>
-            <a:off x="838200" y="1825625"/>
+            <a:off x="838201" y="1825625"/>
             <a:ext cx="5181600" cy="4351338"/>
           </a:xfrm>
         </p:spPr>
@@ -1336,7 +1344,7 @@
         </p:nvSpPr>
         <p:spPr>
           <a:xfrm>
-            <a:off x="6172200" y="1825625"/>
+            <a:off x="6172201" y="1825625"/>
             <a:ext cx="5181600" cy="4351338"/>
           </a:xfrm>
         </p:spPr>
@@ -1511,7 +1519,7 @@
         </p:nvSpPr>
         <p:spPr>
           <a:xfrm>
-            <a:off x="839788" y="365125"/>
+            <a:off x="839789" y="365125"/>
             <a:ext cx="10515600" cy="1325563"/>
           </a:xfrm>
         </p:spPr>
@@ -1544,7 +1552,7 @@
         </p:nvSpPr>
         <p:spPr>
           <a:xfrm>
-            <a:off x="839788" y="1681163"/>
+            <a:off x="839793" y="1681163"/>
             <a:ext cx="5157787" cy="823912"/>
           </a:xfrm>
         </p:spPr>
@@ -1555,35 +1563,35 @@
               <a:buNone/>
               <a:defRPr sz="2400" b="1"/>
             </a:lvl1pPr>
-            <a:lvl2pPr marL="457200" indent="0">
+            <a:lvl2pPr marL="457218" indent="0">
               <a:buNone/>
               <a:defRPr sz="2000" b="1"/>
             </a:lvl2pPr>
-            <a:lvl3pPr marL="914400" indent="0">
+            <a:lvl3pPr marL="914435" indent="0">
               <a:buNone/>
-              <a:defRPr sz="1800" b="1"/>
+              <a:defRPr sz="1801" b="1"/>
             </a:lvl3pPr>
-            <a:lvl4pPr marL="1371600" indent="0">
+            <a:lvl4pPr marL="1371651" indent="0">
               <a:buNone/>
               <a:defRPr sz="1600" b="1"/>
             </a:lvl4pPr>
-            <a:lvl5pPr marL="1828800" indent="0">
+            <a:lvl5pPr marL="1828869" indent="0">
               <a:buNone/>
               <a:defRPr sz="1600" b="1"/>
             </a:lvl5pPr>
-            <a:lvl6pPr marL="2286000" indent="0">
+            <a:lvl6pPr marL="2286085" indent="0">
               <a:buNone/>
               <a:defRPr sz="1600" b="1"/>
             </a:lvl6pPr>
-            <a:lvl7pPr marL="2743200" indent="0">
+            <a:lvl7pPr marL="2743302" indent="0">
               <a:buNone/>
               <a:defRPr sz="1600" b="1"/>
             </a:lvl7pPr>
-            <a:lvl8pPr marL="3200400" indent="0">
+            <a:lvl8pPr marL="3200520" indent="0">
               <a:buNone/>
               <a:defRPr sz="1600" b="1"/>
             </a:lvl8pPr>
-            <a:lvl9pPr marL="3657600" indent="0">
+            <a:lvl9pPr marL="3657738" indent="0">
               <a:buNone/>
               <a:defRPr sz="1600" b="1"/>
             </a:lvl9pPr>
@@ -1615,7 +1623,7 @@
         </p:nvSpPr>
         <p:spPr>
           <a:xfrm>
-            <a:off x="839788" y="2505075"/>
+            <a:off x="839793" y="2505076"/>
             <a:ext cx="5157787" cy="3684588"/>
           </a:xfrm>
         </p:spPr>
@@ -1677,7 +1685,7 @@
         </p:nvSpPr>
         <p:spPr>
           <a:xfrm>
-            <a:off x="6172200" y="1681163"/>
+            <a:off x="6172203" y="1681163"/>
             <a:ext cx="5183188" cy="823912"/>
           </a:xfrm>
         </p:spPr>
@@ -1688,35 +1696,35 @@
               <a:buNone/>
               <a:defRPr sz="2400" b="1"/>
             </a:lvl1pPr>
-            <a:lvl2pPr marL="457200" indent="0">
+            <a:lvl2pPr marL="457218" indent="0">
               <a:buNone/>
               <a:defRPr sz="2000" b="1"/>
             </a:lvl2pPr>
-            <a:lvl3pPr marL="914400" indent="0">
+            <a:lvl3pPr marL="914435" indent="0">
               <a:buNone/>
-              <a:defRPr sz="1800" b="1"/>
+              <a:defRPr sz="1801" b="1"/>
             </a:lvl3pPr>
-            <a:lvl4pPr marL="1371600" indent="0">
+            <a:lvl4pPr marL="1371651" indent="0">
               <a:buNone/>
               <a:defRPr sz="1600" b="1"/>
             </a:lvl4pPr>
-            <a:lvl5pPr marL="1828800" indent="0">
+            <a:lvl5pPr marL="1828869" indent="0">
               <a:buNone/>
               <a:defRPr sz="1600" b="1"/>
             </a:lvl5pPr>
-            <a:lvl6pPr marL="2286000" indent="0">
+            <a:lvl6pPr marL="2286085" indent="0">
               <a:buNone/>
               <a:defRPr sz="1600" b="1"/>
             </a:lvl6pPr>
-            <a:lvl7pPr marL="2743200" indent="0">
+            <a:lvl7pPr marL="2743302" indent="0">
               <a:buNone/>
               <a:defRPr sz="1600" b="1"/>
             </a:lvl7pPr>
-            <a:lvl8pPr marL="3200400" indent="0">
+            <a:lvl8pPr marL="3200520" indent="0">
               <a:buNone/>
               <a:defRPr sz="1600" b="1"/>
             </a:lvl8pPr>
-            <a:lvl9pPr marL="3657600" indent="0">
+            <a:lvl9pPr marL="3657738" indent="0">
               <a:buNone/>
               <a:defRPr sz="1600" b="1"/>
             </a:lvl9pPr>
@@ -1748,7 +1756,7 @@
         </p:nvSpPr>
         <p:spPr>
           <a:xfrm>
-            <a:off x="6172200" y="2505075"/>
+            <a:off x="6172203" y="2505076"/>
             <a:ext cx="5183188" cy="3684588"/>
           </a:xfrm>
         </p:spPr>
@@ -2177,8 +2185,8 @@
         </p:nvSpPr>
         <p:spPr>
           <a:xfrm>
-            <a:off x="839788" y="457200"/>
-            <a:ext cx="3932237" cy="1600200"/>
+            <a:off x="839791" y="457200"/>
+            <a:ext cx="3932236" cy="1600200"/>
           </a:xfrm>
         </p:spPr>
         <p:txBody>
@@ -2214,8 +2222,8 @@
         </p:nvSpPr>
         <p:spPr>
           <a:xfrm>
-            <a:off x="5183188" y="987425"/>
-            <a:ext cx="6172200" cy="4873625"/>
+            <a:off x="5183192" y="987425"/>
+            <a:ext cx="6172201" cy="4873625"/>
           </a:xfrm>
         </p:spPr>
         <p:txBody>
@@ -2304,8 +2312,8 @@
         </p:nvSpPr>
         <p:spPr>
           <a:xfrm>
-            <a:off x="839788" y="2057400"/>
-            <a:ext cx="3932237" cy="3811588"/>
+            <a:off x="839791" y="2057400"/>
+            <a:ext cx="3932236" cy="3811588"/>
           </a:xfrm>
         </p:spPr>
         <p:txBody>
@@ -2315,37 +2323,37 @@
               <a:buNone/>
               <a:defRPr sz="1600"/>
             </a:lvl1pPr>
-            <a:lvl2pPr marL="457200" indent="0">
+            <a:lvl2pPr marL="457218" indent="0">
               <a:buNone/>
-              <a:defRPr sz="1400"/>
+              <a:defRPr sz="1401"/>
             </a:lvl2pPr>
-            <a:lvl3pPr marL="914400" indent="0">
+            <a:lvl3pPr marL="914435" indent="0">
               <a:buNone/>
               <a:defRPr sz="1200"/>
             </a:lvl3pPr>
-            <a:lvl4pPr marL="1371600" indent="0">
+            <a:lvl4pPr marL="1371651" indent="0">
               <a:buNone/>
-              <a:defRPr sz="1000"/>
+              <a:defRPr sz="1001"/>
             </a:lvl4pPr>
-            <a:lvl5pPr marL="1828800" indent="0">
+            <a:lvl5pPr marL="1828869" indent="0">
               <a:buNone/>
-              <a:defRPr sz="1000"/>
+              <a:defRPr sz="1001"/>
             </a:lvl5pPr>
-            <a:lvl6pPr marL="2286000" indent="0">
+            <a:lvl6pPr marL="2286085" indent="0">
               <a:buNone/>
-              <a:defRPr sz="1000"/>
+              <a:defRPr sz="1001"/>
             </a:lvl6pPr>
-            <a:lvl7pPr marL="2743200" indent="0">
+            <a:lvl7pPr marL="2743302" indent="0">
               <a:buNone/>
-              <a:defRPr sz="1000"/>
+              <a:defRPr sz="1001"/>
             </a:lvl7pPr>
-            <a:lvl8pPr marL="3200400" indent="0">
+            <a:lvl8pPr marL="3200520" indent="0">
               <a:buNone/>
-              <a:defRPr sz="1000"/>
+              <a:defRPr sz="1001"/>
             </a:lvl8pPr>
-            <a:lvl9pPr marL="3657600" indent="0">
+            <a:lvl9pPr marL="3657738" indent="0">
               <a:buNone/>
-              <a:defRPr sz="1000"/>
+              <a:defRPr sz="1001"/>
             </a:lvl9pPr>
           </a:lstStyle>
           <a:p>
@@ -2488,8 +2496,8 @@
         </p:nvSpPr>
         <p:spPr>
           <a:xfrm>
-            <a:off x="839788" y="457200"/>
-            <a:ext cx="3932237" cy="1600200"/>
+            <a:off x="839791" y="457200"/>
+            <a:ext cx="3932236" cy="1600200"/>
           </a:xfrm>
         </p:spPr>
         <p:txBody>
@@ -2525,8 +2533,8 @@
         </p:nvSpPr>
         <p:spPr>
           <a:xfrm>
-            <a:off x="5183188" y="987425"/>
-            <a:ext cx="6172200" cy="4873625"/>
+            <a:off x="5183192" y="987425"/>
+            <a:ext cx="6172201" cy="4873625"/>
           </a:xfrm>
         </p:spPr>
         <p:txBody>
@@ -2536,35 +2544,35 @@
               <a:buNone/>
               <a:defRPr sz="3200"/>
             </a:lvl1pPr>
-            <a:lvl2pPr marL="457200" indent="0">
+            <a:lvl2pPr marL="457218" indent="0">
               <a:buNone/>
               <a:defRPr sz="2800"/>
             </a:lvl2pPr>
-            <a:lvl3pPr marL="914400" indent="0">
+            <a:lvl3pPr marL="914435" indent="0">
               <a:buNone/>
               <a:defRPr sz="2400"/>
             </a:lvl3pPr>
-            <a:lvl4pPr marL="1371600" indent="0">
+            <a:lvl4pPr marL="1371651" indent="0">
               <a:buNone/>
               <a:defRPr sz="2000"/>
             </a:lvl4pPr>
-            <a:lvl5pPr marL="1828800" indent="0">
+            <a:lvl5pPr marL="1828869" indent="0">
               <a:buNone/>
               <a:defRPr sz="2000"/>
             </a:lvl5pPr>
-            <a:lvl6pPr marL="2286000" indent="0">
+            <a:lvl6pPr marL="2286085" indent="0">
               <a:buNone/>
               <a:defRPr sz="2000"/>
             </a:lvl6pPr>
-            <a:lvl7pPr marL="2743200" indent="0">
+            <a:lvl7pPr marL="2743302" indent="0">
               <a:buNone/>
               <a:defRPr sz="2000"/>
             </a:lvl7pPr>
-            <a:lvl8pPr marL="3200400" indent="0">
+            <a:lvl8pPr marL="3200520" indent="0">
               <a:buNone/>
               <a:defRPr sz="2000"/>
             </a:lvl8pPr>
-            <a:lvl9pPr marL="3657600" indent="0">
+            <a:lvl9pPr marL="3657738" indent="0">
               <a:buNone/>
               <a:defRPr sz="2000"/>
             </a:lvl9pPr>
@@ -2592,8 +2600,8 @@
         </p:nvSpPr>
         <p:spPr>
           <a:xfrm>
-            <a:off x="839788" y="2057400"/>
-            <a:ext cx="3932237" cy="3811588"/>
+            <a:off x="839791" y="2057400"/>
+            <a:ext cx="3932236" cy="3811588"/>
           </a:xfrm>
         </p:spPr>
         <p:txBody>
@@ -2603,37 +2611,37 @@
               <a:buNone/>
               <a:defRPr sz="1600"/>
             </a:lvl1pPr>
-            <a:lvl2pPr marL="457200" indent="0">
+            <a:lvl2pPr marL="457218" indent="0">
               <a:buNone/>
-              <a:defRPr sz="1400"/>
+              <a:defRPr sz="1401"/>
             </a:lvl2pPr>
-            <a:lvl3pPr marL="914400" indent="0">
+            <a:lvl3pPr marL="914435" indent="0">
               <a:buNone/>
               <a:defRPr sz="1200"/>
             </a:lvl3pPr>
-            <a:lvl4pPr marL="1371600" indent="0">
+            <a:lvl4pPr marL="1371651" indent="0">
               <a:buNone/>
-              <a:defRPr sz="1000"/>
+              <a:defRPr sz="1001"/>
             </a:lvl4pPr>
-            <a:lvl5pPr marL="1828800" indent="0">
+            <a:lvl5pPr marL="1828869" indent="0">
               <a:buNone/>
-              <a:defRPr sz="1000"/>
+              <a:defRPr sz="1001"/>
             </a:lvl5pPr>
-            <a:lvl6pPr marL="2286000" indent="0">
+            <a:lvl6pPr marL="2286085" indent="0">
               <a:buNone/>
-              <a:defRPr sz="1000"/>
+              <a:defRPr sz="1001"/>
             </a:lvl6pPr>
-            <a:lvl7pPr marL="2743200" indent="0">
+            <a:lvl7pPr marL="2743302" indent="0">
               <a:buNone/>
-              <a:defRPr sz="1000"/>
+              <a:defRPr sz="1001"/>
             </a:lvl7pPr>
-            <a:lvl8pPr marL="3200400" indent="0">
+            <a:lvl8pPr marL="3200520" indent="0">
               <a:buNone/>
-              <a:defRPr sz="1000"/>
+              <a:defRPr sz="1001"/>
             </a:lvl8pPr>
-            <a:lvl9pPr marL="3657600" indent="0">
+            <a:lvl9pPr marL="3657738" indent="0">
               <a:buNone/>
-              <a:defRPr sz="1000"/>
+              <a:defRPr sz="1001"/>
             </a:lvl9pPr>
           </a:lstStyle>
           <a:p>
@@ -2781,7 +2789,7 @@
         </p:nvSpPr>
         <p:spPr>
           <a:xfrm>
-            <a:off x="838200" y="365125"/>
+            <a:off x="838205" y="365125"/>
             <a:ext cx="10515600" cy="1325563"/>
           </a:xfrm>
           <a:prstGeom prst="rect">
@@ -2819,7 +2827,7 @@
         </p:nvSpPr>
         <p:spPr>
           <a:xfrm>
-            <a:off x="838200" y="1825625"/>
+            <a:off x="838205" y="1825625"/>
             <a:ext cx="10515600" cy="4351338"/>
           </a:xfrm>
           <a:prstGeom prst="rect">
@@ -2886,7 +2894,7 @@
         </p:nvSpPr>
         <p:spPr>
           <a:xfrm>
-            <a:off x="838200" y="6356350"/>
+            <a:off x="838201" y="6356353"/>
             <a:ext cx="2743200" cy="365125"/>
           </a:xfrm>
           <a:prstGeom prst="rect">
@@ -2933,7 +2941,7 @@
         </p:nvSpPr>
         <p:spPr>
           <a:xfrm>
-            <a:off x="4038600" y="6356350"/>
+            <a:off x="4038605" y="6356353"/>
             <a:ext cx="4114800" cy="365125"/>
           </a:xfrm>
           <a:prstGeom prst="rect">
@@ -2976,7 +2984,7 @@
         </p:nvSpPr>
         <p:spPr>
           <a:xfrm>
-            <a:off x="8610600" y="6356350"/>
+            <a:off x="8610601" y="6356353"/>
             <a:ext cx="2743200" cy="365125"/>
           </a:xfrm>
           <a:prstGeom prst="rect">
@@ -3028,7 +3036,7 @@
   </p:sldLayoutIdLst>
   <p:txStyles>
     <p:titleStyle>
-      <a:lvl1pPr algn="l" defTabSz="914400" rtl="0" eaLnBrk="1" latinLnBrk="0" hangingPunct="1">
+      <a:lvl1pPr algn="l" defTabSz="914435" rtl="0" eaLnBrk="1" latinLnBrk="0" hangingPunct="1">
         <a:lnSpc>
           <a:spcPct val="90000"/>
         </a:lnSpc>
@@ -3047,12 +3055,12 @@
       </a:lvl1pPr>
     </p:titleStyle>
     <p:bodyStyle>
-      <a:lvl1pPr marL="228600" indent="-228600" algn="l" defTabSz="914400" rtl="0" eaLnBrk="1" latinLnBrk="0" hangingPunct="1">
+      <a:lvl1pPr marL="228609" indent="-228609" algn="l" defTabSz="914435" rtl="0" eaLnBrk="1" latinLnBrk="0" hangingPunct="1">
         <a:lnSpc>
           <a:spcPct val="90000"/>
         </a:lnSpc>
         <a:spcBef>
-          <a:spcPts val="1000"/>
+          <a:spcPts val="1001"/>
         </a:spcBef>
         <a:buFont typeface="Arial" panose="020B0604020202020204" pitchFamily="34" charset="0"/>
         <a:buChar char="•"/>
@@ -3065,7 +3073,7 @@
           <a:cs typeface="+mn-cs"/>
         </a:defRPr>
       </a:lvl1pPr>
-      <a:lvl2pPr marL="685800" indent="-228600" algn="l" defTabSz="914400" rtl="0" eaLnBrk="1" latinLnBrk="0" hangingPunct="1">
+      <a:lvl2pPr marL="685825" indent="-228609" algn="l" defTabSz="914435" rtl="0" eaLnBrk="1" latinLnBrk="0" hangingPunct="1">
         <a:lnSpc>
           <a:spcPct val="90000"/>
         </a:lnSpc>
@@ -3083,7 +3091,7 @@
           <a:cs typeface="+mn-cs"/>
         </a:defRPr>
       </a:lvl2pPr>
-      <a:lvl3pPr marL="1143000" indent="-228600" algn="l" defTabSz="914400" rtl="0" eaLnBrk="1" latinLnBrk="0" hangingPunct="1">
+      <a:lvl3pPr marL="1143044" indent="-228609" algn="l" defTabSz="914435" rtl="0" eaLnBrk="1" latinLnBrk="0" hangingPunct="1">
         <a:lnSpc>
           <a:spcPct val="90000"/>
         </a:lnSpc>
@@ -3101,7 +3109,7 @@
           <a:cs typeface="+mn-cs"/>
         </a:defRPr>
       </a:lvl3pPr>
-      <a:lvl4pPr marL="1600200" indent="-228600" algn="l" defTabSz="914400" rtl="0" eaLnBrk="1" latinLnBrk="0" hangingPunct="1">
+      <a:lvl4pPr marL="1600262" indent="-228609" algn="l" defTabSz="914435" rtl="0" eaLnBrk="1" latinLnBrk="0" hangingPunct="1">
         <a:lnSpc>
           <a:spcPct val="90000"/>
         </a:lnSpc>
@@ -3110,7 +3118,7 @@
         </a:spcBef>
         <a:buFont typeface="Arial" panose="020B0604020202020204" pitchFamily="34" charset="0"/>
         <a:buChar char="•"/>
-        <a:defRPr sz="1800" kern="1200">
+        <a:defRPr sz="1801" kern="1200">
           <a:solidFill>
             <a:schemeClr val="tx1"/>
           </a:solidFill>
@@ -3119,7 +3127,7 @@
           <a:cs typeface="+mn-cs"/>
         </a:defRPr>
       </a:lvl4pPr>
-      <a:lvl5pPr marL="2057400" indent="-228600" algn="l" defTabSz="914400" rtl="0" eaLnBrk="1" latinLnBrk="0" hangingPunct="1">
+      <a:lvl5pPr marL="2057478" indent="-228609" algn="l" defTabSz="914435" rtl="0" eaLnBrk="1" latinLnBrk="0" hangingPunct="1">
         <a:lnSpc>
           <a:spcPct val="90000"/>
         </a:lnSpc>
@@ -3128,7 +3136,7 @@
         </a:spcBef>
         <a:buFont typeface="Arial" panose="020B0604020202020204" pitchFamily="34" charset="0"/>
         <a:buChar char="•"/>
-        <a:defRPr sz="1800" kern="1200">
+        <a:defRPr sz="1801" kern="1200">
           <a:solidFill>
             <a:schemeClr val="tx1"/>
           </a:solidFill>
@@ -3137,7 +3145,7 @@
           <a:cs typeface="+mn-cs"/>
         </a:defRPr>
       </a:lvl5pPr>
-      <a:lvl6pPr marL="2514600" indent="-228600" algn="l" defTabSz="914400" rtl="0" eaLnBrk="1" latinLnBrk="0" hangingPunct="1">
+      <a:lvl6pPr marL="2514696" indent="-228609" algn="l" defTabSz="914435" rtl="0" eaLnBrk="1" latinLnBrk="0" hangingPunct="1">
         <a:lnSpc>
           <a:spcPct val="90000"/>
         </a:lnSpc>
@@ -3146,7 +3154,7 @@
         </a:spcBef>
         <a:buFont typeface="Arial" panose="020B0604020202020204" pitchFamily="34" charset="0"/>
         <a:buChar char="•"/>
-        <a:defRPr sz="1800" kern="1200">
+        <a:defRPr sz="1801" kern="1200">
           <a:solidFill>
             <a:schemeClr val="tx1"/>
           </a:solidFill>
@@ -3155,7 +3163,7 @@
           <a:cs typeface="+mn-cs"/>
         </a:defRPr>
       </a:lvl6pPr>
-      <a:lvl7pPr marL="2971800" indent="-228600" algn="l" defTabSz="914400" rtl="0" eaLnBrk="1" latinLnBrk="0" hangingPunct="1">
+      <a:lvl7pPr marL="2971913" indent="-228609" algn="l" defTabSz="914435" rtl="0" eaLnBrk="1" latinLnBrk="0" hangingPunct="1">
         <a:lnSpc>
           <a:spcPct val="90000"/>
         </a:lnSpc>
@@ -3164,7 +3172,7 @@
         </a:spcBef>
         <a:buFont typeface="Arial" panose="020B0604020202020204" pitchFamily="34" charset="0"/>
         <a:buChar char="•"/>
-        <a:defRPr sz="1800" kern="1200">
+        <a:defRPr sz="1801" kern="1200">
           <a:solidFill>
             <a:schemeClr val="tx1"/>
           </a:solidFill>
@@ -3173,7 +3181,7 @@
           <a:cs typeface="+mn-cs"/>
         </a:defRPr>
       </a:lvl7pPr>
-      <a:lvl8pPr marL="3429000" indent="-228600" algn="l" defTabSz="914400" rtl="0" eaLnBrk="1" latinLnBrk="0" hangingPunct="1">
+      <a:lvl8pPr marL="3429129" indent="-228609" algn="l" defTabSz="914435" rtl="0" eaLnBrk="1" latinLnBrk="0" hangingPunct="1">
         <a:lnSpc>
           <a:spcPct val="90000"/>
         </a:lnSpc>
@@ -3182,7 +3190,7 @@
         </a:spcBef>
         <a:buFont typeface="Arial" panose="020B0604020202020204" pitchFamily="34" charset="0"/>
         <a:buChar char="•"/>
-        <a:defRPr sz="1800" kern="1200">
+        <a:defRPr sz="1801" kern="1200">
           <a:solidFill>
             <a:schemeClr val="tx1"/>
           </a:solidFill>
@@ -3191,7 +3199,7 @@
           <a:cs typeface="+mn-cs"/>
         </a:defRPr>
       </a:lvl8pPr>
-      <a:lvl9pPr marL="3886200" indent="-228600" algn="l" defTabSz="914400" rtl="0" eaLnBrk="1" latinLnBrk="0" hangingPunct="1">
+      <a:lvl9pPr marL="3886345" indent="-228609" algn="l" defTabSz="914435" rtl="0" eaLnBrk="1" latinLnBrk="0" hangingPunct="1">
         <a:lnSpc>
           <a:spcPct val="90000"/>
         </a:lnSpc>
@@ -3200,7 +3208,7 @@
         </a:spcBef>
         <a:buFont typeface="Arial" panose="020B0604020202020204" pitchFamily="34" charset="0"/>
         <a:buChar char="•"/>
-        <a:defRPr sz="1800" kern="1200">
+        <a:defRPr sz="1801" kern="1200">
           <a:solidFill>
             <a:schemeClr val="tx1"/>
           </a:solidFill>
@@ -3214,8 +3222,8 @@
       <a:defPPr>
         <a:defRPr lang="en-US"/>
       </a:defPPr>
-      <a:lvl1pPr marL="0" algn="l" defTabSz="914400" rtl="0" eaLnBrk="1" latinLnBrk="0" hangingPunct="1">
-        <a:defRPr sz="1800" kern="1200">
+      <a:lvl1pPr marL="0" algn="l" defTabSz="914435" rtl="0" eaLnBrk="1" latinLnBrk="0" hangingPunct="1">
+        <a:defRPr sz="1801" kern="1200">
           <a:solidFill>
             <a:schemeClr val="tx1"/>
           </a:solidFill>
@@ -3224,8 +3232,8 @@
           <a:cs typeface="+mn-cs"/>
         </a:defRPr>
       </a:lvl1pPr>
-      <a:lvl2pPr marL="457200" algn="l" defTabSz="914400" rtl="0" eaLnBrk="1" latinLnBrk="0" hangingPunct="1">
-        <a:defRPr sz="1800" kern="1200">
+      <a:lvl2pPr marL="457218" algn="l" defTabSz="914435" rtl="0" eaLnBrk="1" latinLnBrk="0" hangingPunct="1">
+        <a:defRPr sz="1801" kern="1200">
           <a:solidFill>
             <a:schemeClr val="tx1"/>
           </a:solidFill>
@@ -3234,8 +3242,8 @@
           <a:cs typeface="+mn-cs"/>
         </a:defRPr>
       </a:lvl2pPr>
-      <a:lvl3pPr marL="914400" algn="l" defTabSz="914400" rtl="0" eaLnBrk="1" latinLnBrk="0" hangingPunct="1">
-        <a:defRPr sz="1800" kern="1200">
+      <a:lvl3pPr marL="914435" algn="l" defTabSz="914435" rtl="0" eaLnBrk="1" latinLnBrk="0" hangingPunct="1">
+        <a:defRPr sz="1801" kern="1200">
           <a:solidFill>
             <a:schemeClr val="tx1"/>
           </a:solidFill>
@@ -3244,8 +3252,8 @@
           <a:cs typeface="+mn-cs"/>
         </a:defRPr>
       </a:lvl3pPr>
-      <a:lvl4pPr marL="1371600" algn="l" defTabSz="914400" rtl="0" eaLnBrk="1" latinLnBrk="0" hangingPunct="1">
-        <a:defRPr sz="1800" kern="1200">
+      <a:lvl4pPr marL="1371651" algn="l" defTabSz="914435" rtl="0" eaLnBrk="1" latinLnBrk="0" hangingPunct="1">
+        <a:defRPr sz="1801" kern="1200">
           <a:solidFill>
             <a:schemeClr val="tx1"/>
           </a:solidFill>
@@ -3254,8 +3262,8 @@
           <a:cs typeface="+mn-cs"/>
         </a:defRPr>
       </a:lvl4pPr>
-      <a:lvl5pPr marL="1828800" algn="l" defTabSz="914400" rtl="0" eaLnBrk="1" latinLnBrk="0" hangingPunct="1">
-        <a:defRPr sz="1800" kern="1200">
+      <a:lvl5pPr marL="1828869" algn="l" defTabSz="914435" rtl="0" eaLnBrk="1" latinLnBrk="0" hangingPunct="1">
+        <a:defRPr sz="1801" kern="1200">
           <a:solidFill>
             <a:schemeClr val="tx1"/>
           </a:solidFill>
@@ -3264,8 +3272,8 @@
           <a:cs typeface="+mn-cs"/>
         </a:defRPr>
       </a:lvl5pPr>
-      <a:lvl6pPr marL="2286000" algn="l" defTabSz="914400" rtl="0" eaLnBrk="1" latinLnBrk="0" hangingPunct="1">
-        <a:defRPr sz="1800" kern="1200">
+      <a:lvl6pPr marL="2286085" algn="l" defTabSz="914435" rtl="0" eaLnBrk="1" latinLnBrk="0" hangingPunct="1">
+        <a:defRPr sz="1801" kern="1200">
           <a:solidFill>
             <a:schemeClr val="tx1"/>
           </a:solidFill>
@@ -3274,8 +3282,8 @@
           <a:cs typeface="+mn-cs"/>
         </a:defRPr>
       </a:lvl6pPr>
-      <a:lvl7pPr marL="2743200" algn="l" defTabSz="914400" rtl="0" eaLnBrk="1" latinLnBrk="0" hangingPunct="1">
-        <a:defRPr sz="1800" kern="1200">
+      <a:lvl7pPr marL="2743302" algn="l" defTabSz="914435" rtl="0" eaLnBrk="1" latinLnBrk="0" hangingPunct="1">
+        <a:defRPr sz="1801" kern="1200">
           <a:solidFill>
             <a:schemeClr val="tx1"/>
           </a:solidFill>
@@ -3284,8 +3292,8 @@
           <a:cs typeface="+mn-cs"/>
         </a:defRPr>
       </a:lvl7pPr>
-      <a:lvl8pPr marL="3200400" algn="l" defTabSz="914400" rtl="0" eaLnBrk="1" latinLnBrk="0" hangingPunct="1">
-        <a:defRPr sz="1800" kern="1200">
+      <a:lvl8pPr marL="3200520" algn="l" defTabSz="914435" rtl="0" eaLnBrk="1" latinLnBrk="0" hangingPunct="1">
+        <a:defRPr sz="1801" kern="1200">
           <a:solidFill>
             <a:schemeClr val="tx1"/>
           </a:solidFill>
@@ -3294,8 +3302,8 @@
           <a:cs typeface="+mn-cs"/>
         </a:defRPr>
       </a:lvl8pPr>
-      <a:lvl9pPr marL="3657600" algn="l" defTabSz="914400" rtl="0" eaLnBrk="1" latinLnBrk="0" hangingPunct="1">
-        <a:defRPr sz="1800" kern="1200">
+      <a:lvl9pPr marL="3657738" algn="l" defTabSz="914435" rtl="0" eaLnBrk="1" latinLnBrk="0" hangingPunct="1">
+        <a:defRPr sz="1801" kern="1200">
           <a:solidFill>
             <a:schemeClr val="tx1"/>
           </a:solidFill>
@@ -3351,7 +3359,7 @@
         </p:nvSpPr>
         <p:spPr>
           <a:xfrm>
-            <a:off x="3988395" y="3973799"/>
+            <a:off x="3988399" y="3973798"/>
             <a:ext cx="1945147" cy="846030"/>
           </a:xfrm>
           <a:prstGeom prst="triangle">
@@ -3387,7 +3395,7 @@
           <a:lstStyle/>
           <a:p>
             <a:pPr algn="ctr"/>
-            <a:endParaRPr lang="en-US"/>
+            <a:endParaRPr lang="en-US" sz="1801"/>
           </a:p>
         </p:txBody>
       </p:sp>
@@ -3405,8 +3413,8 @@
         </p:nvSpPr>
         <p:spPr>
           <a:xfrm>
-            <a:off x="4960969" y="3973796"/>
-            <a:ext cx="595266" cy="846031"/>
+            <a:off x="4960971" y="3973797"/>
+            <a:ext cx="595266" cy="846030"/>
           </a:xfrm>
           <a:prstGeom prst="rect">
             <a:avLst/>
@@ -3439,7 +3447,7 @@
           <a:lstStyle/>
           <a:p>
             <a:pPr algn="ctr"/>
-            <a:endParaRPr lang="en-US"/>
+            <a:endParaRPr lang="en-US" sz="1801"/>
           </a:p>
         </p:txBody>
       </p:sp>
@@ -3457,8 +3465,8 @@
         </p:nvSpPr>
         <p:spPr>
           <a:xfrm>
-            <a:off x="5508911" y="4298535"/>
-            <a:ext cx="1584424" cy="521292"/>
+            <a:off x="5508913" y="4298535"/>
+            <a:ext cx="1584425" cy="521292"/>
           </a:xfrm>
           <a:prstGeom prst="rect">
             <a:avLst/>
@@ -3491,7 +3499,7 @@
           <a:lstStyle/>
           <a:p>
             <a:pPr algn="ctr"/>
-            <a:endParaRPr lang="en-US"/>
+            <a:endParaRPr lang="en-US" sz="1801"/>
           </a:p>
         </p:txBody>
       </p:sp>
@@ -3509,7 +3517,7 @@
         </p:nvSpPr>
         <p:spPr>
           <a:xfrm>
-            <a:off x="4572818" y="3973795"/>
+            <a:off x="4572822" y="3973797"/>
             <a:ext cx="1945147" cy="846030"/>
           </a:xfrm>
           <a:prstGeom prst="triangle">
@@ -3545,7 +3553,7 @@
           <a:lstStyle/>
           <a:p>
             <a:pPr algn="ctr"/>
-            <a:endParaRPr lang="en-US"/>
+            <a:endParaRPr lang="en-US" sz="1801"/>
           </a:p>
         </p:txBody>
       </p:sp>
@@ -3563,8 +3571,8 @@
         </p:nvSpPr>
         <p:spPr>
           <a:xfrm>
-            <a:off x="6513278" y="4298535"/>
-            <a:ext cx="1160113" cy="521291"/>
+            <a:off x="6513280" y="4298536"/>
+            <a:ext cx="1160114" cy="521291"/>
           </a:xfrm>
           <a:prstGeom prst="triangle">
             <a:avLst>
@@ -3599,7 +3607,7 @@
           <a:lstStyle/>
           <a:p>
             <a:pPr algn="ctr"/>
-            <a:endParaRPr lang="en-US"/>
+            <a:endParaRPr lang="en-US" sz="1801"/>
           </a:p>
         </p:txBody>
       </p:sp>
@@ -3617,8 +3625,8 @@
         </p:nvSpPr>
         <p:spPr>
           <a:xfrm>
-            <a:off x="4811782" y="3640509"/>
-            <a:ext cx="1467217" cy="658024"/>
+            <a:off x="4811781" y="3640512"/>
+            <a:ext cx="1467218" cy="658025"/>
           </a:xfrm>
           <a:prstGeom prst="trapezoid">
             <a:avLst>
@@ -3653,7 +3661,7 @@
           <a:lstStyle/>
           <a:p>
             <a:pPr algn="ctr"/>
-            <a:endParaRPr lang="en-US"/>
+            <a:endParaRPr lang="en-US" sz="1801"/>
           </a:p>
         </p:txBody>
       </p:sp>
@@ -3671,8 +3679,8 @@
         </p:nvSpPr>
         <p:spPr>
           <a:xfrm>
-            <a:off x="3547404" y="4362632"/>
-            <a:ext cx="562223" cy="235005"/>
+            <a:off x="3547405" y="4362632"/>
+            <a:ext cx="562222" cy="235004"/>
           </a:xfrm>
           <a:prstGeom prst="trapezoid">
             <a:avLst/>
@@ -3705,7 +3713,7 @@
           <a:lstStyle/>
           <a:p>
             <a:pPr algn="ctr"/>
-            <a:endParaRPr lang="en-US"/>
+            <a:endParaRPr lang="en-US" sz="1801"/>
           </a:p>
         </p:txBody>
       </p:sp>
@@ -3726,8 +3734,8 @@
         </p:nvCxnSpPr>
         <p:spPr>
           <a:xfrm flipH="1" flipV="1">
-            <a:off x="3170097" y="4438472"/>
-            <a:ext cx="406683" cy="41663"/>
+            <a:off x="3170100" y="4438477"/>
+            <a:ext cx="406683" cy="41662"/>
           </a:xfrm>
           <a:prstGeom prst="line">
             <a:avLst/>
@@ -3767,8 +3775,8 @@
         </p:nvSpPr>
         <p:spPr>
           <a:xfrm>
-            <a:off x="7765159" y="4597637"/>
-            <a:ext cx="562223" cy="235005"/>
+            <a:off x="7765159" y="4597638"/>
+            <a:ext cx="562222" cy="235004"/>
           </a:xfrm>
           <a:prstGeom prst="trapezoid">
             <a:avLst/>
@@ -3801,7 +3809,7 @@
           <a:lstStyle/>
           <a:p>
             <a:pPr algn="ctr"/>
-            <a:endParaRPr lang="en-US"/>
+            <a:endParaRPr lang="en-US" sz="1801"/>
           </a:p>
         </p:txBody>
       </p:sp>
@@ -3821,7 +3829,7 @@
         </p:nvCxnSpPr>
         <p:spPr>
           <a:xfrm flipH="1">
-            <a:off x="8267419" y="4682024"/>
+            <a:off x="8267423" y="4682024"/>
             <a:ext cx="406683" cy="20828"/>
           </a:xfrm>
           <a:prstGeom prst="line">
@@ -3862,7 +3870,7 @@
         </p:nvSpPr>
         <p:spPr>
           <a:xfrm rot="18988050">
-            <a:off x="4544053" y="3136307"/>
+            <a:off x="4544056" y="3136307"/>
             <a:ext cx="2025353" cy="2068082"/>
           </a:xfrm>
           <a:prstGeom prst="arc">
@@ -3897,7 +3905,7 @@
           <a:lstStyle/>
           <a:p>
             <a:pPr algn="ctr"/>
-            <a:endParaRPr lang="en-US"/>
+            <a:endParaRPr lang="en-US" sz="1801"/>
           </a:p>
         </p:txBody>
       </p:sp>
@@ -3916,7 +3924,7 @@
         <p:spPr>
           <a:xfrm rot="19059588">
             <a:off x="3779724" y="2471992"/>
-            <a:ext cx="3438848" cy="3285878"/>
+            <a:ext cx="3438848" cy="3285877"/>
           </a:xfrm>
           <a:prstGeom prst="arc">
             <a:avLst>
@@ -3950,7 +3958,7 @@
           <a:lstStyle/>
           <a:p>
             <a:pPr algn="ctr"/>
-            <a:endParaRPr lang="en-US"/>
+            <a:endParaRPr lang="en-US" sz="1801"/>
           </a:p>
         </p:txBody>
       </p:sp>
@@ -3968,8 +3976,8 @@
         </p:nvSpPr>
         <p:spPr>
           <a:xfrm rot="19090921">
-            <a:off x="3135365" y="1799240"/>
-            <a:ext cx="4681133" cy="4472902"/>
+            <a:off x="3135366" y="1799243"/>
+            <a:ext cx="4681132" cy="4472901"/>
           </a:xfrm>
           <a:prstGeom prst="arc">
             <a:avLst>
@@ -4003,7 +4011,7 @@
           <a:lstStyle/>
           <a:p>
             <a:pPr algn="ctr"/>
-            <a:endParaRPr lang="en-US"/>
+            <a:endParaRPr lang="en-US" sz="1801"/>
           </a:p>
         </p:txBody>
       </p:sp>
@@ -4021,8 +4029,8 @@
         </p:nvSpPr>
         <p:spPr>
           <a:xfrm>
-            <a:off x="3828516" y="4819828"/>
-            <a:ext cx="4341263" cy="946939"/>
+            <a:off x="3828517" y="4819831"/>
+            <a:ext cx="4341262" cy="946939"/>
           </a:xfrm>
           <a:prstGeom prst="rect">
             <a:avLst/>
@@ -4055,7 +4063,7 @@
           <a:lstStyle/>
           <a:p>
             <a:pPr algn="ctr"/>
-            <a:endParaRPr lang="en-US"/>
+            <a:endParaRPr lang="en-US" sz="1801"/>
           </a:p>
         </p:txBody>
       </p:sp>
@@ -4073,8 +4081,8 @@
         </p:nvSpPr>
         <p:spPr>
           <a:xfrm flipV="1">
-            <a:off x="2858218" y="4597637"/>
-            <a:ext cx="1945147" cy="1169130"/>
+            <a:off x="2858221" y="4597636"/>
+            <a:ext cx="1945147" cy="1169131"/>
           </a:xfrm>
           <a:prstGeom prst="triangle">
             <a:avLst>
@@ -4109,7 +4117,7 @@
           <a:lstStyle/>
           <a:p>
             <a:pPr algn="ctr"/>
-            <a:endParaRPr lang="en-US"/>
+            <a:endParaRPr lang="en-US" sz="1801"/>
           </a:p>
         </p:txBody>
       </p:sp>
@@ -4127,8 +4135,8 @@
         </p:nvSpPr>
         <p:spPr>
           <a:xfrm flipV="1">
-            <a:off x="7527020" y="4819828"/>
-            <a:ext cx="1306397" cy="946939"/>
+            <a:off x="7527021" y="4819831"/>
+            <a:ext cx="1306396" cy="946939"/>
           </a:xfrm>
           <a:prstGeom prst="triangle">
             <a:avLst/>
@@ -4161,7 +4169,7 @@
           <a:lstStyle/>
           <a:p>
             <a:pPr algn="ctr"/>
-            <a:endParaRPr lang="en-US"/>
+            <a:endParaRPr lang="en-US" sz="1801"/>
           </a:p>
         </p:txBody>
       </p:sp>
@@ -4181,8 +4189,8 @@
         </p:nvCxnSpPr>
         <p:spPr>
           <a:xfrm flipH="1">
-            <a:off x="4279348" y="1177589"/>
-            <a:ext cx="2682648" cy="2682648"/>
+            <a:off x="4279349" y="1177590"/>
+            <a:ext cx="2682649" cy="2682649"/>
           </a:xfrm>
           <a:prstGeom prst="line">
             <a:avLst/>
@@ -4222,7 +4230,7 @@
         </p:nvSpPr>
         <p:spPr>
           <a:xfrm>
-            <a:off x="3547404" y="497466"/>
+            <a:off x="3547405" y="497466"/>
             <a:ext cx="4152894" cy="3989076"/>
           </a:xfrm>
           <a:prstGeom prst="ellipse">
@@ -4256,7 +4264,7 @@
           <a:lstStyle/>
           <a:p>
             <a:pPr algn="ctr"/>
-            <a:endParaRPr lang="en-US"/>
+            <a:endParaRPr lang="en-US" sz="1801"/>
           </a:p>
         </p:txBody>
       </p:sp>
@@ -4315,7 +4323,7 @@
         </p:nvSpPr>
         <p:spPr>
           <a:xfrm>
-            <a:off x="3988395" y="3973799"/>
+            <a:off x="3988399" y="3973798"/>
             <a:ext cx="1945147" cy="846030"/>
           </a:xfrm>
           <a:prstGeom prst="triangle">
@@ -4351,7 +4359,7 @@
           <a:lstStyle/>
           <a:p>
             <a:pPr algn="ctr"/>
-            <a:endParaRPr lang="en-US"/>
+            <a:endParaRPr lang="en-US" sz="1801"/>
           </a:p>
         </p:txBody>
       </p:sp>
@@ -4369,8 +4377,8 @@
         </p:nvSpPr>
         <p:spPr>
           <a:xfrm>
-            <a:off x="4960969" y="3973796"/>
-            <a:ext cx="595266" cy="846031"/>
+            <a:off x="4960971" y="3973797"/>
+            <a:ext cx="595266" cy="846030"/>
           </a:xfrm>
           <a:prstGeom prst="rect">
             <a:avLst/>
@@ -4403,7 +4411,7 @@
           <a:lstStyle/>
           <a:p>
             <a:pPr algn="ctr"/>
-            <a:endParaRPr lang="en-US"/>
+            <a:endParaRPr lang="en-US" sz="1801"/>
           </a:p>
         </p:txBody>
       </p:sp>
@@ -4421,8 +4429,8 @@
         </p:nvSpPr>
         <p:spPr>
           <a:xfrm>
-            <a:off x="5508911" y="4298535"/>
-            <a:ext cx="1584424" cy="521292"/>
+            <a:off x="5508913" y="4298535"/>
+            <a:ext cx="1584425" cy="521292"/>
           </a:xfrm>
           <a:prstGeom prst="rect">
             <a:avLst/>
@@ -4455,7 +4463,7 @@
           <a:lstStyle/>
           <a:p>
             <a:pPr algn="ctr"/>
-            <a:endParaRPr lang="en-US"/>
+            <a:endParaRPr lang="en-US" sz="1801"/>
           </a:p>
         </p:txBody>
       </p:sp>
@@ -4473,7 +4481,7 @@
         </p:nvSpPr>
         <p:spPr>
           <a:xfrm>
-            <a:off x="4572818" y="3973795"/>
+            <a:off x="4572822" y="3973797"/>
             <a:ext cx="1945147" cy="846030"/>
           </a:xfrm>
           <a:prstGeom prst="triangle">
@@ -4509,7 +4517,7 @@
           <a:lstStyle/>
           <a:p>
             <a:pPr algn="ctr"/>
-            <a:endParaRPr lang="en-US"/>
+            <a:endParaRPr lang="en-US" sz="1801"/>
           </a:p>
         </p:txBody>
       </p:sp>
@@ -4527,8 +4535,8 @@
         </p:nvSpPr>
         <p:spPr>
           <a:xfrm>
-            <a:off x="6513278" y="4298535"/>
-            <a:ext cx="1160113" cy="521291"/>
+            <a:off x="6513280" y="4298536"/>
+            <a:ext cx="1160114" cy="521291"/>
           </a:xfrm>
           <a:prstGeom prst="triangle">
             <a:avLst>
@@ -4563,7 +4571,7 @@
           <a:lstStyle/>
           <a:p>
             <a:pPr algn="ctr"/>
-            <a:endParaRPr lang="en-US"/>
+            <a:endParaRPr lang="en-US" sz="1801"/>
           </a:p>
         </p:txBody>
       </p:sp>
@@ -4581,8 +4589,8 @@
         </p:nvSpPr>
         <p:spPr>
           <a:xfrm>
-            <a:off x="4811782" y="3640509"/>
-            <a:ext cx="1467217" cy="658024"/>
+            <a:off x="4811781" y="3640512"/>
+            <a:ext cx="1467218" cy="658025"/>
           </a:xfrm>
           <a:prstGeom prst="trapezoid">
             <a:avLst>
@@ -4617,7 +4625,7 @@
           <a:lstStyle/>
           <a:p>
             <a:pPr algn="ctr"/>
-            <a:endParaRPr lang="en-US"/>
+            <a:endParaRPr lang="en-US" sz="1801"/>
           </a:p>
         </p:txBody>
       </p:sp>
@@ -4635,8 +4643,8 @@
         </p:nvSpPr>
         <p:spPr>
           <a:xfrm>
-            <a:off x="3547404" y="4362632"/>
-            <a:ext cx="562223" cy="235005"/>
+            <a:off x="3547405" y="4362632"/>
+            <a:ext cx="562222" cy="235004"/>
           </a:xfrm>
           <a:prstGeom prst="trapezoid">
             <a:avLst/>
@@ -4669,7 +4677,7 @@
           <a:lstStyle/>
           <a:p>
             <a:pPr algn="ctr"/>
-            <a:endParaRPr lang="en-US"/>
+            <a:endParaRPr lang="en-US" sz="1801"/>
           </a:p>
         </p:txBody>
       </p:sp>
@@ -4690,8 +4698,8 @@
         </p:nvCxnSpPr>
         <p:spPr>
           <a:xfrm flipH="1" flipV="1">
-            <a:off x="3170097" y="4438472"/>
-            <a:ext cx="406683" cy="41663"/>
+            <a:off x="3170100" y="4438477"/>
+            <a:ext cx="406683" cy="41662"/>
           </a:xfrm>
           <a:prstGeom prst="line">
             <a:avLst/>
@@ -4731,8 +4739,8 @@
         </p:nvSpPr>
         <p:spPr>
           <a:xfrm>
-            <a:off x="7765159" y="4597637"/>
-            <a:ext cx="562223" cy="235005"/>
+            <a:off x="7765159" y="4597638"/>
+            <a:ext cx="562222" cy="235004"/>
           </a:xfrm>
           <a:prstGeom prst="trapezoid">
             <a:avLst/>
@@ -4765,7 +4773,7 @@
           <a:lstStyle/>
           <a:p>
             <a:pPr algn="ctr"/>
-            <a:endParaRPr lang="en-US"/>
+            <a:endParaRPr lang="en-US" sz="1801"/>
           </a:p>
         </p:txBody>
       </p:sp>
@@ -4785,7 +4793,7 @@
         </p:nvCxnSpPr>
         <p:spPr>
           <a:xfrm flipH="1">
-            <a:off x="8267419" y="4682024"/>
+            <a:off x="8267423" y="4682024"/>
             <a:ext cx="406683" cy="20828"/>
           </a:xfrm>
           <a:prstGeom prst="line">
@@ -4826,7 +4834,7 @@
         </p:nvSpPr>
         <p:spPr>
           <a:xfrm rot="18988050">
-            <a:off x="4544053" y="3136307"/>
+            <a:off x="4544056" y="3136307"/>
             <a:ext cx="2025353" cy="2068082"/>
           </a:xfrm>
           <a:prstGeom prst="arc">
@@ -4861,7 +4869,7 @@
           <a:lstStyle/>
           <a:p>
             <a:pPr algn="ctr"/>
-            <a:endParaRPr lang="en-US"/>
+            <a:endParaRPr lang="en-US" sz="1801"/>
           </a:p>
         </p:txBody>
       </p:sp>
@@ -4880,7 +4888,7 @@
         <p:spPr>
           <a:xfrm rot="19059588">
             <a:off x="3779724" y="2471992"/>
-            <a:ext cx="3438848" cy="3285878"/>
+            <a:ext cx="3438848" cy="3285877"/>
           </a:xfrm>
           <a:prstGeom prst="arc">
             <a:avLst>
@@ -4914,7 +4922,7 @@
           <a:lstStyle/>
           <a:p>
             <a:pPr algn="ctr"/>
-            <a:endParaRPr lang="en-US"/>
+            <a:endParaRPr lang="en-US" sz="1801"/>
           </a:p>
         </p:txBody>
       </p:sp>
@@ -4932,8 +4940,8 @@
         </p:nvSpPr>
         <p:spPr>
           <a:xfrm rot="19090921">
-            <a:off x="3135365" y="1799240"/>
-            <a:ext cx="4681133" cy="4472902"/>
+            <a:off x="3135366" y="1799243"/>
+            <a:ext cx="4681132" cy="4472901"/>
           </a:xfrm>
           <a:prstGeom prst="arc">
             <a:avLst>
@@ -4967,7 +4975,7 @@
           <a:lstStyle/>
           <a:p>
             <a:pPr algn="ctr"/>
-            <a:endParaRPr lang="en-US"/>
+            <a:endParaRPr lang="en-US" sz="1801"/>
           </a:p>
         </p:txBody>
       </p:sp>
@@ -4985,8 +4993,8 @@
         </p:nvSpPr>
         <p:spPr>
           <a:xfrm>
-            <a:off x="3828516" y="4819828"/>
-            <a:ext cx="4341263" cy="946939"/>
+            <a:off x="3828517" y="4819831"/>
+            <a:ext cx="4341262" cy="946939"/>
           </a:xfrm>
           <a:prstGeom prst="rect">
             <a:avLst/>
@@ -5019,7 +5027,7 @@
           <a:lstStyle/>
           <a:p>
             <a:pPr algn="ctr"/>
-            <a:endParaRPr lang="en-US"/>
+            <a:endParaRPr lang="en-US" sz="1801"/>
           </a:p>
         </p:txBody>
       </p:sp>
@@ -5037,8 +5045,8 @@
         </p:nvSpPr>
         <p:spPr>
           <a:xfrm flipV="1">
-            <a:off x="2858218" y="4597637"/>
-            <a:ext cx="1945147" cy="1169130"/>
+            <a:off x="2858221" y="4597636"/>
+            <a:ext cx="1945147" cy="1169131"/>
           </a:xfrm>
           <a:prstGeom prst="triangle">
             <a:avLst>
@@ -5073,7 +5081,7 @@
           <a:lstStyle/>
           <a:p>
             <a:pPr algn="ctr"/>
-            <a:endParaRPr lang="en-US"/>
+            <a:endParaRPr lang="en-US" sz="1801"/>
           </a:p>
         </p:txBody>
       </p:sp>
@@ -5091,8 +5099,8 @@
         </p:nvSpPr>
         <p:spPr>
           <a:xfrm flipV="1">
-            <a:off x="7527020" y="4819828"/>
-            <a:ext cx="1306397" cy="946939"/>
+            <a:off x="7527021" y="4819831"/>
+            <a:ext cx="1306396" cy="946939"/>
           </a:xfrm>
           <a:prstGeom prst="triangle">
             <a:avLst/>
@@ -5125,7 +5133,7 @@
           <a:lstStyle/>
           <a:p>
             <a:pPr algn="ctr"/>
-            <a:endParaRPr lang="en-US"/>
+            <a:endParaRPr lang="en-US" sz="1801"/>
           </a:p>
         </p:txBody>
       </p:sp>
@@ -5143,7 +5151,7 @@
         </p:nvSpPr>
         <p:spPr>
           <a:xfrm>
-            <a:off x="3547404" y="497466"/>
+            <a:off x="3547405" y="497466"/>
             <a:ext cx="4152894" cy="3989076"/>
           </a:xfrm>
           <a:prstGeom prst="ellipse">
@@ -5177,7 +5185,7 @@
           <a:lstStyle/>
           <a:p>
             <a:pPr algn="ctr"/>
-            <a:endParaRPr lang="en-US"/>
+            <a:endParaRPr lang="en-US" sz="1801"/>
           </a:p>
         </p:txBody>
       </p:sp>
@@ -5236,7 +5244,7 @@
         </p:nvSpPr>
         <p:spPr>
           <a:xfrm>
-            <a:off x="3988395" y="3973799"/>
+            <a:off x="3988399" y="3973798"/>
             <a:ext cx="1945147" cy="846030"/>
           </a:xfrm>
           <a:prstGeom prst="triangle">
@@ -5272,7 +5280,7 @@
           <a:lstStyle/>
           <a:p>
             <a:pPr algn="ctr"/>
-            <a:endParaRPr lang="en-US"/>
+            <a:endParaRPr lang="en-US" sz="1801"/>
           </a:p>
         </p:txBody>
       </p:sp>
@@ -5290,8 +5298,8 @@
         </p:nvSpPr>
         <p:spPr>
           <a:xfrm>
-            <a:off x="4960969" y="3973796"/>
-            <a:ext cx="595266" cy="846031"/>
+            <a:off x="4960971" y="3973797"/>
+            <a:ext cx="595266" cy="846030"/>
           </a:xfrm>
           <a:prstGeom prst="rect">
             <a:avLst/>
@@ -5324,7 +5332,7 @@
           <a:lstStyle/>
           <a:p>
             <a:pPr algn="ctr"/>
-            <a:endParaRPr lang="en-US"/>
+            <a:endParaRPr lang="en-US" sz="1801"/>
           </a:p>
         </p:txBody>
       </p:sp>
@@ -5342,8 +5350,8 @@
         </p:nvSpPr>
         <p:spPr>
           <a:xfrm>
-            <a:off x="5508911" y="4298535"/>
-            <a:ext cx="1584424" cy="521292"/>
+            <a:off x="5508913" y="4298535"/>
+            <a:ext cx="1584425" cy="521292"/>
           </a:xfrm>
           <a:prstGeom prst="rect">
             <a:avLst/>
@@ -5376,7 +5384,7 @@
           <a:lstStyle/>
           <a:p>
             <a:pPr algn="ctr"/>
-            <a:endParaRPr lang="en-US"/>
+            <a:endParaRPr lang="en-US" sz="1801"/>
           </a:p>
         </p:txBody>
       </p:sp>
@@ -5394,7 +5402,7 @@
         </p:nvSpPr>
         <p:spPr>
           <a:xfrm>
-            <a:off x="4572818" y="3973795"/>
+            <a:off x="4572822" y="3973797"/>
             <a:ext cx="1945147" cy="846030"/>
           </a:xfrm>
           <a:prstGeom prst="triangle">
@@ -5430,7 +5438,7 @@
           <a:lstStyle/>
           <a:p>
             <a:pPr algn="ctr"/>
-            <a:endParaRPr lang="en-US"/>
+            <a:endParaRPr lang="en-US" sz="1801"/>
           </a:p>
         </p:txBody>
       </p:sp>
@@ -5448,8 +5456,8 @@
         </p:nvSpPr>
         <p:spPr>
           <a:xfrm>
-            <a:off x="6513278" y="4298535"/>
-            <a:ext cx="1160113" cy="521291"/>
+            <a:off x="6513280" y="4298536"/>
+            <a:ext cx="1160114" cy="521291"/>
           </a:xfrm>
           <a:prstGeom prst="triangle">
             <a:avLst>
@@ -5484,7 +5492,7 @@
           <a:lstStyle/>
           <a:p>
             <a:pPr algn="ctr"/>
-            <a:endParaRPr lang="en-US"/>
+            <a:endParaRPr lang="en-US" sz="1801"/>
           </a:p>
         </p:txBody>
       </p:sp>
@@ -5502,8 +5510,8 @@
         </p:nvSpPr>
         <p:spPr>
           <a:xfrm>
-            <a:off x="4811782" y="3640509"/>
-            <a:ext cx="1467217" cy="658024"/>
+            <a:off x="4811781" y="3640512"/>
+            <a:ext cx="1467218" cy="658025"/>
           </a:xfrm>
           <a:prstGeom prst="trapezoid">
             <a:avLst>
@@ -5538,7 +5546,7 @@
           <a:lstStyle/>
           <a:p>
             <a:pPr algn="ctr"/>
-            <a:endParaRPr lang="en-US"/>
+            <a:endParaRPr lang="en-US" sz="1801"/>
           </a:p>
         </p:txBody>
       </p:sp>
@@ -5556,8 +5564,8 @@
         </p:nvSpPr>
         <p:spPr>
           <a:xfrm>
-            <a:off x="3547404" y="4362632"/>
-            <a:ext cx="562223" cy="235005"/>
+            <a:off x="3547405" y="4362632"/>
+            <a:ext cx="562222" cy="235004"/>
           </a:xfrm>
           <a:prstGeom prst="trapezoid">
             <a:avLst/>
@@ -5590,7 +5598,7 @@
           <a:lstStyle/>
           <a:p>
             <a:pPr algn="ctr"/>
-            <a:endParaRPr lang="en-US"/>
+            <a:endParaRPr lang="en-US" sz="1801"/>
           </a:p>
         </p:txBody>
       </p:sp>
@@ -5611,8 +5619,8 @@
         </p:nvCxnSpPr>
         <p:spPr>
           <a:xfrm flipH="1" flipV="1">
-            <a:off x="3170097" y="4438472"/>
-            <a:ext cx="406683" cy="41663"/>
+            <a:off x="3170100" y="4438477"/>
+            <a:ext cx="406683" cy="41662"/>
           </a:xfrm>
           <a:prstGeom prst="line">
             <a:avLst/>
@@ -5652,8 +5660,8 @@
         </p:nvSpPr>
         <p:spPr>
           <a:xfrm>
-            <a:off x="7765159" y="4597637"/>
-            <a:ext cx="562223" cy="235005"/>
+            <a:off x="7765159" y="4597638"/>
+            <a:ext cx="562222" cy="235004"/>
           </a:xfrm>
           <a:prstGeom prst="trapezoid">
             <a:avLst/>
@@ -5686,7 +5694,7 @@
           <a:lstStyle/>
           <a:p>
             <a:pPr algn="ctr"/>
-            <a:endParaRPr lang="en-US"/>
+            <a:endParaRPr lang="en-US" sz="1801"/>
           </a:p>
         </p:txBody>
       </p:sp>
@@ -5706,7 +5714,7 @@
         </p:nvCxnSpPr>
         <p:spPr>
           <a:xfrm flipH="1">
-            <a:off x="8267419" y="4682024"/>
+            <a:off x="8267423" y="4682024"/>
             <a:ext cx="406683" cy="20828"/>
           </a:xfrm>
           <a:prstGeom prst="line">
@@ -5747,7 +5755,7 @@
         </p:nvSpPr>
         <p:spPr>
           <a:xfrm rot="18988050">
-            <a:off x="4544053" y="3136307"/>
+            <a:off x="4544056" y="3136307"/>
             <a:ext cx="2025353" cy="2068082"/>
           </a:xfrm>
           <a:prstGeom prst="arc">
@@ -5782,7 +5790,7 @@
           <a:lstStyle/>
           <a:p>
             <a:pPr algn="ctr"/>
-            <a:endParaRPr lang="en-US"/>
+            <a:endParaRPr lang="en-US" sz="1801"/>
           </a:p>
         </p:txBody>
       </p:sp>
@@ -5801,7 +5809,7 @@
         <p:spPr>
           <a:xfrm rot="19059588">
             <a:off x="3779724" y="2471992"/>
-            <a:ext cx="3438848" cy="3285878"/>
+            <a:ext cx="3438848" cy="3285877"/>
           </a:xfrm>
           <a:prstGeom prst="arc">
             <a:avLst>
@@ -5835,7 +5843,7 @@
           <a:lstStyle/>
           <a:p>
             <a:pPr algn="ctr"/>
-            <a:endParaRPr lang="en-US"/>
+            <a:endParaRPr lang="en-US" sz="1801"/>
           </a:p>
         </p:txBody>
       </p:sp>
@@ -5853,8 +5861,8 @@
         </p:nvSpPr>
         <p:spPr>
           <a:xfrm rot="19090921">
-            <a:off x="3135365" y="1799240"/>
-            <a:ext cx="4681133" cy="4472902"/>
+            <a:off x="3135366" y="1799243"/>
+            <a:ext cx="4681132" cy="4472901"/>
           </a:xfrm>
           <a:prstGeom prst="arc">
             <a:avLst>
@@ -5888,7 +5896,7 @@
           <a:lstStyle/>
           <a:p>
             <a:pPr algn="ctr"/>
-            <a:endParaRPr lang="en-US"/>
+            <a:endParaRPr lang="en-US" sz="1801"/>
           </a:p>
         </p:txBody>
       </p:sp>
@@ -5906,8 +5914,8 @@
         </p:nvSpPr>
         <p:spPr>
           <a:xfrm>
-            <a:off x="3828516" y="4819828"/>
-            <a:ext cx="4341263" cy="946939"/>
+            <a:off x="3828517" y="4819831"/>
+            <a:ext cx="4341262" cy="946939"/>
           </a:xfrm>
           <a:prstGeom prst="rect">
             <a:avLst/>
@@ -5940,7 +5948,7 @@
           <a:lstStyle/>
           <a:p>
             <a:pPr algn="ctr"/>
-            <a:endParaRPr lang="en-US"/>
+            <a:endParaRPr lang="en-US" sz="1801"/>
           </a:p>
         </p:txBody>
       </p:sp>
@@ -5958,8 +5966,8 @@
         </p:nvSpPr>
         <p:spPr>
           <a:xfrm flipV="1">
-            <a:off x="2858218" y="4597637"/>
-            <a:ext cx="1945147" cy="1169130"/>
+            <a:off x="2858221" y="4597636"/>
+            <a:ext cx="1945147" cy="1169131"/>
           </a:xfrm>
           <a:prstGeom prst="triangle">
             <a:avLst>
@@ -5994,7 +6002,7 @@
           <a:lstStyle/>
           <a:p>
             <a:pPr algn="ctr"/>
-            <a:endParaRPr lang="en-US"/>
+            <a:endParaRPr lang="en-US" sz="1801"/>
           </a:p>
         </p:txBody>
       </p:sp>
@@ -6012,8 +6020,8 @@
         </p:nvSpPr>
         <p:spPr>
           <a:xfrm flipV="1">
-            <a:off x="7527020" y="4819828"/>
-            <a:ext cx="1306397" cy="946939"/>
+            <a:off x="7527021" y="4819831"/>
+            <a:ext cx="1306396" cy="946939"/>
           </a:xfrm>
           <a:prstGeom prst="triangle">
             <a:avLst/>
@@ -6046,7 +6054,7 @@
           <a:lstStyle/>
           <a:p>
             <a:pPr algn="ctr"/>
-            <a:endParaRPr lang="en-US"/>
+            <a:endParaRPr lang="en-US" sz="1801"/>
           </a:p>
         </p:txBody>
       </p:sp>
@@ -6064,7 +6072,7 @@
         </p:nvSpPr>
         <p:spPr>
           <a:xfrm>
-            <a:off x="3547404" y="497466"/>
+            <a:off x="3547405" y="497466"/>
             <a:ext cx="4152894" cy="3989076"/>
           </a:xfrm>
           <a:prstGeom prst="ellipse">
@@ -6098,7 +6106,7 @@
           <a:lstStyle/>
           <a:p>
             <a:pPr algn="ctr"/>
-            <a:endParaRPr lang="en-US"/>
+            <a:endParaRPr lang="en-US" sz="1801"/>
           </a:p>
         </p:txBody>
       </p:sp>
@@ -6157,7 +6165,7 @@
         </p:nvSpPr>
         <p:spPr>
           <a:xfrm>
-            <a:off x="3988395" y="3973799"/>
+            <a:off x="3988399" y="3973798"/>
             <a:ext cx="1945147" cy="846030"/>
           </a:xfrm>
           <a:prstGeom prst="triangle">
@@ -6193,7 +6201,7 @@
           <a:lstStyle/>
           <a:p>
             <a:pPr algn="ctr"/>
-            <a:endParaRPr lang="en-US"/>
+            <a:endParaRPr lang="en-US" sz="1801"/>
           </a:p>
         </p:txBody>
       </p:sp>
@@ -6211,8 +6219,8 @@
         </p:nvSpPr>
         <p:spPr>
           <a:xfrm>
-            <a:off x="4960969" y="3973796"/>
-            <a:ext cx="595266" cy="846031"/>
+            <a:off x="4960971" y="3973797"/>
+            <a:ext cx="595266" cy="846030"/>
           </a:xfrm>
           <a:prstGeom prst="rect">
             <a:avLst/>
@@ -6245,7 +6253,7 @@
           <a:lstStyle/>
           <a:p>
             <a:pPr algn="ctr"/>
-            <a:endParaRPr lang="en-US"/>
+            <a:endParaRPr lang="en-US" sz="1801"/>
           </a:p>
         </p:txBody>
       </p:sp>
@@ -6263,8 +6271,8 @@
         </p:nvSpPr>
         <p:spPr>
           <a:xfrm>
-            <a:off x="5508911" y="4298535"/>
-            <a:ext cx="1584424" cy="521292"/>
+            <a:off x="5508913" y="4298535"/>
+            <a:ext cx="1584425" cy="521292"/>
           </a:xfrm>
           <a:prstGeom prst="rect">
             <a:avLst/>
@@ -6297,7 +6305,7 @@
           <a:lstStyle/>
           <a:p>
             <a:pPr algn="ctr"/>
-            <a:endParaRPr lang="en-US"/>
+            <a:endParaRPr lang="en-US" sz="1801"/>
           </a:p>
         </p:txBody>
       </p:sp>
@@ -6315,7 +6323,7 @@
         </p:nvSpPr>
         <p:spPr>
           <a:xfrm>
-            <a:off x="4572818" y="3973795"/>
+            <a:off x="4572822" y="3973797"/>
             <a:ext cx="1945147" cy="846030"/>
           </a:xfrm>
           <a:prstGeom prst="triangle">
@@ -6351,7 +6359,7 @@
           <a:lstStyle/>
           <a:p>
             <a:pPr algn="ctr"/>
-            <a:endParaRPr lang="en-US"/>
+            <a:endParaRPr lang="en-US" sz="1801"/>
           </a:p>
         </p:txBody>
       </p:sp>
@@ -6369,8 +6377,8 @@
         </p:nvSpPr>
         <p:spPr>
           <a:xfrm>
-            <a:off x="6513278" y="4298535"/>
-            <a:ext cx="1160113" cy="521291"/>
+            <a:off x="6513280" y="4298536"/>
+            <a:ext cx="1160114" cy="521291"/>
           </a:xfrm>
           <a:prstGeom prst="triangle">
             <a:avLst>
@@ -6405,7 +6413,7 @@
           <a:lstStyle/>
           <a:p>
             <a:pPr algn="ctr"/>
-            <a:endParaRPr lang="en-US"/>
+            <a:endParaRPr lang="en-US" sz="1801"/>
           </a:p>
         </p:txBody>
       </p:sp>
@@ -6423,8 +6431,8 @@
         </p:nvSpPr>
         <p:spPr>
           <a:xfrm>
-            <a:off x="4811782" y="3640509"/>
-            <a:ext cx="1467217" cy="658024"/>
+            <a:off x="4811781" y="3640512"/>
+            <a:ext cx="1467218" cy="658025"/>
           </a:xfrm>
           <a:prstGeom prst="trapezoid">
             <a:avLst>
@@ -6459,7 +6467,7 @@
           <a:lstStyle/>
           <a:p>
             <a:pPr algn="ctr"/>
-            <a:endParaRPr lang="en-US"/>
+            <a:endParaRPr lang="en-US" sz="1801"/>
           </a:p>
         </p:txBody>
       </p:sp>
@@ -6477,8 +6485,8 @@
         </p:nvSpPr>
         <p:spPr>
           <a:xfrm>
-            <a:off x="3547404" y="4362632"/>
-            <a:ext cx="562223" cy="235005"/>
+            <a:off x="3547405" y="4362632"/>
+            <a:ext cx="562222" cy="235004"/>
           </a:xfrm>
           <a:prstGeom prst="trapezoid">
             <a:avLst/>
@@ -6511,7 +6519,7 @@
           <a:lstStyle/>
           <a:p>
             <a:pPr algn="ctr"/>
-            <a:endParaRPr lang="en-US"/>
+            <a:endParaRPr lang="en-US" sz="1801"/>
           </a:p>
         </p:txBody>
       </p:sp>
@@ -6532,8 +6540,8 @@
         </p:nvCxnSpPr>
         <p:spPr>
           <a:xfrm flipH="1" flipV="1">
-            <a:off x="3170097" y="4438472"/>
-            <a:ext cx="406683" cy="41663"/>
+            <a:off x="3170100" y="4438477"/>
+            <a:ext cx="406683" cy="41662"/>
           </a:xfrm>
           <a:prstGeom prst="line">
             <a:avLst/>
@@ -6573,8 +6581,8 @@
         </p:nvSpPr>
         <p:spPr>
           <a:xfrm>
-            <a:off x="7765159" y="4597637"/>
-            <a:ext cx="562223" cy="235005"/>
+            <a:off x="7765159" y="4597638"/>
+            <a:ext cx="562222" cy="235004"/>
           </a:xfrm>
           <a:prstGeom prst="trapezoid">
             <a:avLst/>
@@ -6607,7 +6615,7 @@
           <a:lstStyle/>
           <a:p>
             <a:pPr algn="ctr"/>
-            <a:endParaRPr lang="en-US"/>
+            <a:endParaRPr lang="en-US" sz="1801"/>
           </a:p>
         </p:txBody>
       </p:sp>
@@ -6627,7 +6635,7 @@
         </p:nvCxnSpPr>
         <p:spPr>
           <a:xfrm flipH="1">
-            <a:off x="8267419" y="4682024"/>
+            <a:off x="8267423" y="4682024"/>
             <a:ext cx="406683" cy="20828"/>
           </a:xfrm>
           <a:prstGeom prst="line">
@@ -6668,7 +6676,7 @@
         </p:nvSpPr>
         <p:spPr>
           <a:xfrm rot="18988050">
-            <a:off x="4544053" y="3136307"/>
+            <a:off x="4544056" y="3136307"/>
             <a:ext cx="2025353" cy="2068082"/>
           </a:xfrm>
           <a:prstGeom prst="arc">
@@ -6703,7 +6711,7 @@
           <a:lstStyle/>
           <a:p>
             <a:pPr algn="ctr"/>
-            <a:endParaRPr lang="en-US"/>
+            <a:endParaRPr lang="en-US" sz="1801"/>
           </a:p>
         </p:txBody>
       </p:sp>
@@ -6722,7 +6730,7 @@
         <p:spPr>
           <a:xfrm rot="19059588">
             <a:off x="3779724" y="2471992"/>
-            <a:ext cx="3438848" cy="3285878"/>
+            <a:ext cx="3438848" cy="3285877"/>
           </a:xfrm>
           <a:prstGeom prst="arc">
             <a:avLst>
@@ -6756,7 +6764,7 @@
           <a:lstStyle/>
           <a:p>
             <a:pPr algn="ctr"/>
-            <a:endParaRPr lang="en-US"/>
+            <a:endParaRPr lang="en-US" sz="1801"/>
           </a:p>
         </p:txBody>
       </p:sp>
@@ -6774,8 +6782,8 @@
         </p:nvSpPr>
         <p:spPr>
           <a:xfrm rot="19090921">
-            <a:off x="3135365" y="1799240"/>
-            <a:ext cx="4681133" cy="4472902"/>
+            <a:off x="3135366" y="1799243"/>
+            <a:ext cx="4681132" cy="4472901"/>
           </a:xfrm>
           <a:prstGeom prst="arc">
             <a:avLst>
@@ -6809,7 +6817,7 @@
           <a:lstStyle/>
           <a:p>
             <a:pPr algn="ctr"/>
-            <a:endParaRPr lang="en-US"/>
+            <a:endParaRPr lang="en-US" sz="1801"/>
           </a:p>
         </p:txBody>
       </p:sp>
@@ -6829,8 +6837,8 @@
         </p:nvCxnSpPr>
         <p:spPr>
           <a:xfrm flipH="1">
-            <a:off x="4279348" y="1177589"/>
-            <a:ext cx="2682648" cy="2682648"/>
+            <a:off x="4279349" y="1177590"/>
+            <a:ext cx="2682649" cy="2682649"/>
           </a:xfrm>
           <a:prstGeom prst="line">
             <a:avLst/>
@@ -6870,8 +6878,8 @@
         </p:nvSpPr>
         <p:spPr>
           <a:xfrm>
-            <a:off x="3828516" y="4819828"/>
-            <a:ext cx="4341263" cy="946939"/>
+            <a:off x="3828517" y="4819831"/>
+            <a:ext cx="4341262" cy="946939"/>
           </a:xfrm>
           <a:prstGeom prst="rect">
             <a:avLst/>
@@ -6904,7 +6912,7 @@
           <a:lstStyle/>
           <a:p>
             <a:pPr algn="ctr"/>
-            <a:endParaRPr lang="en-US"/>
+            <a:endParaRPr lang="en-US" sz="1801"/>
           </a:p>
         </p:txBody>
       </p:sp>
@@ -6922,8 +6930,8 @@
         </p:nvSpPr>
         <p:spPr>
           <a:xfrm flipV="1">
-            <a:off x="2858218" y="4597637"/>
-            <a:ext cx="1945147" cy="1169130"/>
+            <a:off x="2858221" y="4597636"/>
+            <a:ext cx="1945147" cy="1169131"/>
           </a:xfrm>
           <a:prstGeom prst="triangle">
             <a:avLst>
@@ -6958,7 +6966,7 @@
           <a:lstStyle/>
           <a:p>
             <a:pPr algn="ctr"/>
-            <a:endParaRPr lang="en-US"/>
+            <a:endParaRPr lang="en-US" sz="1801"/>
           </a:p>
         </p:txBody>
       </p:sp>
@@ -6976,8 +6984,8 @@
         </p:nvSpPr>
         <p:spPr>
           <a:xfrm flipV="1">
-            <a:off x="7527020" y="4819828"/>
-            <a:ext cx="1306397" cy="946939"/>
+            <a:off x="7527021" y="4819831"/>
+            <a:ext cx="1306396" cy="946939"/>
           </a:xfrm>
           <a:prstGeom prst="triangle">
             <a:avLst/>
@@ -7010,7 +7018,7 @@
           <a:lstStyle/>
           <a:p>
             <a:pPr algn="ctr"/>
-            <a:endParaRPr lang="en-US"/>
+            <a:endParaRPr lang="en-US" sz="1801"/>
           </a:p>
         </p:txBody>
       </p:sp>
@@ -7028,7 +7036,7 @@
         </p:nvSpPr>
         <p:spPr>
           <a:xfrm>
-            <a:off x="3547404" y="497466"/>
+            <a:off x="3547405" y="497466"/>
             <a:ext cx="4152894" cy="3989076"/>
           </a:xfrm>
           <a:prstGeom prst="ellipse">
@@ -7062,7 +7070,7 @@
           <a:lstStyle/>
           <a:p>
             <a:pPr algn="ctr"/>
-            <a:endParaRPr lang="en-US"/>
+            <a:endParaRPr lang="en-US" sz="1801"/>
           </a:p>
         </p:txBody>
       </p:sp>
@@ -7121,7 +7129,7 @@
         </p:nvSpPr>
         <p:spPr>
           <a:xfrm>
-            <a:off x="3988395" y="3973799"/>
+            <a:off x="3988399" y="3973798"/>
             <a:ext cx="1945147" cy="846030"/>
           </a:xfrm>
           <a:prstGeom prst="triangle">
@@ -7157,7 +7165,7 @@
           <a:lstStyle/>
           <a:p>
             <a:pPr algn="ctr"/>
-            <a:endParaRPr lang="en-US"/>
+            <a:endParaRPr lang="en-US" sz="1801"/>
           </a:p>
         </p:txBody>
       </p:sp>
@@ -7175,8 +7183,8 @@
         </p:nvSpPr>
         <p:spPr>
           <a:xfrm>
-            <a:off x="4960969" y="3973796"/>
-            <a:ext cx="595266" cy="846031"/>
+            <a:off x="4960971" y="3973797"/>
+            <a:ext cx="595266" cy="846030"/>
           </a:xfrm>
           <a:prstGeom prst="rect">
             <a:avLst/>
@@ -7209,7 +7217,7 @@
           <a:lstStyle/>
           <a:p>
             <a:pPr algn="ctr"/>
-            <a:endParaRPr lang="en-US"/>
+            <a:endParaRPr lang="en-US" sz="1801"/>
           </a:p>
         </p:txBody>
       </p:sp>
@@ -7227,8 +7235,8 @@
         </p:nvSpPr>
         <p:spPr>
           <a:xfrm>
-            <a:off x="5508911" y="4298535"/>
-            <a:ext cx="1584424" cy="521292"/>
+            <a:off x="5508913" y="4298535"/>
+            <a:ext cx="1584425" cy="521292"/>
           </a:xfrm>
           <a:prstGeom prst="rect">
             <a:avLst/>
@@ -7261,7 +7269,7 @@
           <a:lstStyle/>
           <a:p>
             <a:pPr algn="ctr"/>
-            <a:endParaRPr lang="en-US"/>
+            <a:endParaRPr lang="en-US" sz="1801"/>
           </a:p>
         </p:txBody>
       </p:sp>
@@ -7279,7 +7287,7 @@
         </p:nvSpPr>
         <p:spPr>
           <a:xfrm>
-            <a:off x="4572818" y="3973795"/>
+            <a:off x="4572822" y="3973797"/>
             <a:ext cx="1945147" cy="846030"/>
           </a:xfrm>
           <a:prstGeom prst="triangle">
@@ -7315,7 +7323,7 @@
           <a:lstStyle/>
           <a:p>
             <a:pPr algn="ctr"/>
-            <a:endParaRPr lang="en-US"/>
+            <a:endParaRPr lang="en-US" sz="1801"/>
           </a:p>
         </p:txBody>
       </p:sp>
@@ -7333,8 +7341,8 @@
         </p:nvSpPr>
         <p:spPr>
           <a:xfrm>
-            <a:off x="6513278" y="4298535"/>
-            <a:ext cx="1160113" cy="521291"/>
+            <a:off x="6513280" y="4298536"/>
+            <a:ext cx="1160114" cy="521291"/>
           </a:xfrm>
           <a:prstGeom prst="triangle">
             <a:avLst>
@@ -7369,7 +7377,7 @@
           <a:lstStyle/>
           <a:p>
             <a:pPr algn="ctr"/>
-            <a:endParaRPr lang="en-US"/>
+            <a:endParaRPr lang="en-US" sz="1801"/>
           </a:p>
         </p:txBody>
       </p:sp>
@@ -7387,8 +7395,8 @@
         </p:nvSpPr>
         <p:spPr>
           <a:xfrm>
-            <a:off x="4811782" y="3640509"/>
-            <a:ext cx="1467217" cy="658024"/>
+            <a:off x="4811781" y="3640512"/>
+            <a:ext cx="1467218" cy="658025"/>
           </a:xfrm>
           <a:prstGeom prst="trapezoid">
             <a:avLst>
@@ -7423,7 +7431,7 @@
           <a:lstStyle/>
           <a:p>
             <a:pPr algn="ctr"/>
-            <a:endParaRPr lang="en-US"/>
+            <a:endParaRPr lang="en-US" sz="1801"/>
           </a:p>
         </p:txBody>
       </p:sp>
@@ -7441,8 +7449,8 @@
         </p:nvSpPr>
         <p:spPr>
           <a:xfrm>
-            <a:off x="3547404" y="4362632"/>
-            <a:ext cx="562223" cy="235005"/>
+            <a:off x="3547405" y="4362632"/>
+            <a:ext cx="562222" cy="235004"/>
           </a:xfrm>
           <a:prstGeom prst="trapezoid">
             <a:avLst/>
@@ -7475,7 +7483,7 @@
           <a:lstStyle/>
           <a:p>
             <a:pPr algn="ctr"/>
-            <a:endParaRPr lang="en-US"/>
+            <a:endParaRPr lang="en-US" sz="1801"/>
           </a:p>
         </p:txBody>
       </p:sp>
@@ -7496,8 +7504,8 @@
         </p:nvCxnSpPr>
         <p:spPr>
           <a:xfrm flipH="1" flipV="1">
-            <a:off x="3170097" y="4438472"/>
-            <a:ext cx="406683" cy="41663"/>
+            <a:off x="3170100" y="4438477"/>
+            <a:ext cx="406683" cy="41662"/>
           </a:xfrm>
           <a:prstGeom prst="line">
             <a:avLst/>
@@ -7537,8 +7545,8 @@
         </p:nvSpPr>
         <p:spPr>
           <a:xfrm>
-            <a:off x="7765159" y="4597637"/>
-            <a:ext cx="562223" cy="235005"/>
+            <a:off x="7765159" y="4597638"/>
+            <a:ext cx="562222" cy="235004"/>
           </a:xfrm>
           <a:prstGeom prst="trapezoid">
             <a:avLst/>
@@ -7571,7 +7579,7 @@
           <a:lstStyle/>
           <a:p>
             <a:pPr algn="ctr"/>
-            <a:endParaRPr lang="en-US"/>
+            <a:endParaRPr lang="en-US" sz="1801"/>
           </a:p>
         </p:txBody>
       </p:sp>
@@ -7591,7 +7599,7 @@
         </p:nvCxnSpPr>
         <p:spPr>
           <a:xfrm flipH="1">
-            <a:off x="8267419" y="4682024"/>
+            <a:off x="8267423" y="4682024"/>
             <a:ext cx="406683" cy="20828"/>
           </a:xfrm>
           <a:prstGeom prst="line">
@@ -7632,7 +7640,7 @@
         </p:nvSpPr>
         <p:spPr>
           <a:xfrm rot="18988050">
-            <a:off x="4544053" y="3136307"/>
+            <a:off x="4544056" y="3136307"/>
             <a:ext cx="2025353" cy="2068082"/>
           </a:xfrm>
           <a:prstGeom prst="arc">
@@ -7667,7 +7675,7 @@
           <a:lstStyle/>
           <a:p>
             <a:pPr algn="ctr"/>
-            <a:endParaRPr lang="en-US"/>
+            <a:endParaRPr lang="en-US" sz="1801"/>
           </a:p>
         </p:txBody>
       </p:sp>
@@ -7686,7 +7694,7 @@
         <p:spPr>
           <a:xfrm rot="19059588">
             <a:off x="3779724" y="2471992"/>
-            <a:ext cx="3438848" cy="3285878"/>
+            <a:ext cx="3438848" cy="3285877"/>
           </a:xfrm>
           <a:prstGeom prst="arc">
             <a:avLst>
@@ -7720,7 +7728,7 @@
           <a:lstStyle/>
           <a:p>
             <a:pPr algn="ctr"/>
-            <a:endParaRPr lang="en-US"/>
+            <a:endParaRPr lang="en-US" sz="1801"/>
           </a:p>
         </p:txBody>
       </p:sp>
@@ -7738,8 +7746,8 @@
         </p:nvSpPr>
         <p:spPr>
           <a:xfrm rot="19090921">
-            <a:off x="3135365" y="1799240"/>
-            <a:ext cx="4681133" cy="4472902"/>
+            <a:off x="3135366" y="1799243"/>
+            <a:ext cx="4681132" cy="4472901"/>
           </a:xfrm>
           <a:prstGeom prst="arc">
             <a:avLst>
@@ -7773,7 +7781,7 @@
           <a:lstStyle/>
           <a:p>
             <a:pPr algn="ctr"/>
-            <a:endParaRPr lang="en-US"/>
+            <a:endParaRPr lang="en-US" sz="1801"/>
           </a:p>
         </p:txBody>
       </p:sp>
@@ -7791,8 +7799,8 @@
         </p:nvSpPr>
         <p:spPr>
           <a:xfrm>
-            <a:off x="3828516" y="4819828"/>
-            <a:ext cx="4341263" cy="946939"/>
+            <a:off x="3828517" y="4819831"/>
+            <a:ext cx="4341262" cy="946939"/>
           </a:xfrm>
           <a:prstGeom prst="rect">
             <a:avLst/>
@@ -7825,7 +7833,7 @@
           <a:lstStyle/>
           <a:p>
             <a:pPr algn="ctr"/>
-            <a:endParaRPr lang="en-US"/>
+            <a:endParaRPr lang="en-US" sz="1801"/>
           </a:p>
         </p:txBody>
       </p:sp>
@@ -7843,8 +7851,8 @@
         </p:nvSpPr>
         <p:spPr>
           <a:xfrm flipV="1">
-            <a:off x="2858218" y="4597637"/>
-            <a:ext cx="1945147" cy="1169130"/>
+            <a:off x="2858221" y="4597636"/>
+            <a:ext cx="1945147" cy="1169131"/>
           </a:xfrm>
           <a:prstGeom prst="triangle">
             <a:avLst>
@@ -7879,7 +7887,7 @@
           <a:lstStyle/>
           <a:p>
             <a:pPr algn="ctr"/>
-            <a:endParaRPr lang="en-US"/>
+            <a:endParaRPr lang="en-US" sz="1801"/>
           </a:p>
         </p:txBody>
       </p:sp>
@@ -7897,8 +7905,8 @@
         </p:nvSpPr>
         <p:spPr>
           <a:xfrm flipV="1">
-            <a:off x="7527020" y="4819828"/>
-            <a:ext cx="1306397" cy="946939"/>
+            <a:off x="7527021" y="4819831"/>
+            <a:ext cx="1306396" cy="946939"/>
           </a:xfrm>
           <a:prstGeom prst="triangle">
             <a:avLst/>
@@ -7931,7 +7939,7 @@
           <a:lstStyle/>
           <a:p>
             <a:pPr algn="ctr"/>
-            <a:endParaRPr lang="en-US"/>
+            <a:endParaRPr lang="en-US" sz="1801"/>
           </a:p>
         </p:txBody>
       </p:sp>
@@ -7949,7 +7957,7 @@
         </p:nvSpPr>
         <p:spPr>
           <a:xfrm>
-            <a:off x="3547404" y="497466"/>
+            <a:off x="3547405" y="497466"/>
             <a:ext cx="4152894" cy="3989076"/>
           </a:xfrm>
           <a:prstGeom prst="ellipse">
@@ -7983,7 +7991,7 @@
           <a:lstStyle/>
           <a:p>
             <a:pPr algn="ctr"/>
-            <a:endParaRPr lang="en-US"/>
+            <a:endParaRPr lang="en-US" sz="1801"/>
           </a:p>
         </p:txBody>
       </p:sp>
@@ -8042,8 +8050,8 @@
         </p:nvSpPr>
         <p:spPr>
           <a:xfrm>
-            <a:off x="3828516" y="4819828"/>
-            <a:ext cx="4341263" cy="946939"/>
+            <a:off x="3828517" y="4819831"/>
+            <a:ext cx="4341262" cy="946939"/>
           </a:xfrm>
           <a:prstGeom prst="rect">
             <a:avLst/>
@@ -8076,7 +8084,7 @@
           <a:lstStyle/>
           <a:p>
             <a:pPr algn="ctr"/>
-            <a:endParaRPr lang="en-US"/>
+            <a:endParaRPr lang="en-US" sz="1801"/>
           </a:p>
         </p:txBody>
       </p:sp>
@@ -8094,8 +8102,8 @@
         </p:nvSpPr>
         <p:spPr>
           <a:xfrm flipV="1">
-            <a:off x="2858218" y="4597637"/>
-            <a:ext cx="1945147" cy="1169130"/>
+            <a:off x="2858221" y="4597636"/>
+            <a:ext cx="1945147" cy="1169131"/>
           </a:xfrm>
           <a:prstGeom prst="triangle">
             <a:avLst>
@@ -8130,7 +8138,7 @@
           <a:lstStyle/>
           <a:p>
             <a:pPr algn="ctr"/>
-            <a:endParaRPr lang="en-US"/>
+            <a:endParaRPr lang="en-US" sz="1801"/>
           </a:p>
         </p:txBody>
       </p:sp>
@@ -8148,8 +8156,8 @@
         </p:nvSpPr>
         <p:spPr>
           <a:xfrm flipV="1">
-            <a:off x="7527020" y="4819828"/>
-            <a:ext cx="1306397" cy="946939"/>
+            <a:off x="7527021" y="4819831"/>
+            <a:ext cx="1306396" cy="946939"/>
           </a:xfrm>
           <a:prstGeom prst="triangle">
             <a:avLst/>
@@ -8182,7 +8190,7 @@
           <a:lstStyle/>
           <a:p>
             <a:pPr algn="ctr"/>
-            <a:endParaRPr lang="en-US"/>
+            <a:endParaRPr lang="en-US" sz="1801"/>
           </a:p>
         </p:txBody>
       </p:sp>
@@ -8200,7 +8208,7 @@
         </p:nvSpPr>
         <p:spPr>
           <a:xfrm>
-            <a:off x="3988395" y="3973799"/>
+            <a:off x="3988399" y="3973798"/>
             <a:ext cx="1945147" cy="846030"/>
           </a:xfrm>
           <a:prstGeom prst="triangle">
@@ -8236,7 +8244,7 @@
           <a:lstStyle/>
           <a:p>
             <a:pPr algn="ctr"/>
-            <a:endParaRPr lang="en-US"/>
+            <a:endParaRPr lang="en-US" sz="1801"/>
           </a:p>
         </p:txBody>
       </p:sp>
@@ -8254,8 +8262,8 @@
         </p:nvSpPr>
         <p:spPr>
           <a:xfrm>
-            <a:off x="4960969" y="3973796"/>
-            <a:ext cx="595266" cy="846031"/>
+            <a:off x="4960971" y="3973797"/>
+            <a:ext cx="595266" cy="846030"/>
           </a:xfrm>
           <a:prstGeom prst="rect">
             <a:avLst/>
@@ -8288,7 +8296,7 @@
           <a:lstStyle/>
           <a:p>
             <a:pPr algn="ctr"/>
-            <a:endParaRPr lang="en-US"/>
+            <a:endParaRPr lang="en-US" sz="1801"/>
           </a:p>
         </p:txBody>
       </p:sp>
@@ -8306,8 +8314,8 @@
         </p:nvSpPr>
         <p:spPr>
           <a:xfrm>
-            <a:off x="5508911" y="4298535"/>
-            <a:ext cx="1584424" cy="521292"/>
+            <a:off x="5508913" y="4298535"/>
+            <a:ext cx="1584425" cy="521292"/>
           </a:xfrm>
           <a:prstGeom prst="rect">
             <a:avLst/>
@@ -8340,7 +8348,7 @@
           <a:lstStyle/>
           <a:p>
             <a:pPr algn="ctr"/>
-            <a:endParaRPr lang="en-US"/>
+            <a:endParaRPr lang="en-US" sz="1801"/>
           </a:p>
         </p:txBody>
       </p:sp>
@@ -8358,7 +8366,7 @@
         </p:nvSpPr>
         <p:spPr>
           <a:xfrm>
-            <a:off x="4572818" y="3973795"/>
+            <a:off x="4572822" y="3973797"/>
             <a:ext cx="1945147" cy="846030"/>
           </a:xfrm>
           <a:prstGeom prst="triangle">
@@ -8394,7 +8402,7 @@
           <a:lstStyle/>
           <a:p>
             <a:pPr algn="ctr"/>
-            <a:endParaRPr lang="en-US"/>
+            <a:endParaRPr lang="en-US" sz="1801"/>
           </a:p>
         </p:txBody>
       </p:sp>
@@ -8412,8 +8420,8 @@
         </p:nvSpPr>
         <p:spPr>
           <a:xfrm>
-            <a:off x="6513278" y="4298535"/>
-            <a:ext cx="1160113" cy="521291"/>
+            <a:off x="6513280" y="4298536"/>
+            <a:ext cx="1160114" cy="521291"/>
           </a:xfrm>
           <a:prstGeom prst="triangle">
             <a:avLst>
@@ -8448,7 +8456,7 @@
           <a:lstStyle/>
           <a:p>
             <a:pPr algn="ctr"/>
-            <a:endParaRPr lang="en-US"/>
+            <a:endParaRPr lang="en-US" sz="1801"/>
           </a:p>
         </p:txBody>
       </p:sp>
@@ -8466,8 +8474,8 @@
         </p:nvSpPr>
         <p:spPr>
           <a:xfrm>
-            <a:off x="4811782" y="3640509"/>
-            <a:ext cx="1467217" cy="658024"/>
+            <a:off x="4811781" y="3640512"/>
+            <a:ext cx="1467218" cy="658025"/>
           </a:xfrm>
           <a:prstGeom prst="trapezoid">
             <a:avLst>
@@ -8502,7 +8510,7 @@
           <a:lstStyle/>
           <a:p>
             <a:pPr algn="ctr"/>
-            <a:endParaRPr lang="en-US"/>
+            <a:endParaRPr lang="en-US" sz="1801"/>
           </a:p>
         </p:txBody>
       </p:sp>
@@ -8520,8 +8528,8 @@
         </p:nvSpPr>
         <p:spPr>
           <a:xfrm>
-            <a:off x="3547404" y="4362632"/>
-            <a:ext cx="562223" cy="235005"/>
+            <a:off x="3547405" y="4362632"/>
+            <a:ext cx="562222" cy="235004"/>
           </a:xfrm>
           <a:prstGeom prst="trapezoid">
             <a:avLst/>
@@ -8554,7 +8562,7 @@
           <a:lstStyle/>
           <a:p>
             <a:pPr algn="ctr"/>
-            <a:endParaRPr lang="en-US"/>
+            <a:endParaRPr lang="en-US" sz="1801"/>
           </a:p>
         </p:txBody>
       </p:sp>
@@ -8575,8 +8583,8 @@
         </p:nvCxnSpPr>
         <p:spPr>
           <a:xfrm flipH="1" flipV="1">
-            <a:off x="3170097" y="4438472"/>
-            <a:ext cx="406683" cy="41663"/>
+            <a:off x="3170100" y="4438477"/>
+            <a:ext cx="406683" cy="41662"/>
           </a:xfrm>
           <a:prstGeom prst="line">
             <a:avLst/>
@@ -8616,8 +8624,8 @@
         </p:nvSpPr>
         <p:spPr>
           <a:xfrm>
-            <a:off x="7765159" y="4597637"/>
-            <a:ext cx="562223" cy="235005"/>
+            <a:off x="7765159" y="4597638"/>
+            <a:ext cx="562222" cy="235004"/>
           </a:xfrm>
           <a:prstGeom prst="trapezoid">
             <a:avLst/>
@@ -8650,7 +8658,7 @@
           <a:lstStyle/>
           <a:p>
             <a:pPr algn="ctr"/>
-            <a:endParaRPr lang="en-US"/>
+            <a:endParaRPr lang="en-US" sz="1801"/>
           </a:p>
         </p:txBody>
       </p:sp>
@@ -8670,7 +8678,7 @@
         </p:nvCxnSpPr>
         <p:spPr>
           <a:xfrm flipH="1">
-            <a:off x="8267419" y="4682024"/>
+            <a:off x="8267423" y="4682024"/>
             <a:ext cx="406683" cy="20828"/>
           </a:xfrm>
           <a:prstGeom prst="line">
@@ -8711,7 +8719,7 @@
         </p:nvSpPr>
         <p:spPr>
           <a:xfrm rot="18988050">
-            <a:off x="4544053" y="3136307"/>
+            <a:off x="4544056" y="3136307"/>
             <a:ext cx="2025353" cy="2068082"/>
           </a:xfrm>
           <a:prstGeom prst="arc">
@@ -8746,7 +8754,7 @@
           <a:lstStyle/>
           <a:p>
             <a:pPr algn="ctr"/>
-            <a:endParaRPr lang="en-US"/>
+            <a:endParaRPr lang="en-US" sz="1801"/>
           </a:p>
         </p:txBody>
       </p:sp>
@@ -8765,7 +8773,7 @@
         <p:spPr>
           <a:xfrm rot="19059588">
             <a:off x="3779724" y="2471992"/>
-            <a:ext cx="3438848" cy="3285878"/>
+            <a:ext cx="3438848" cy="3285877"/>
           </a:xfrm>
           <a:prstGeom prst="arc">
             <a:avLst>
@@ -8799,7 +8807,7 @@
           <a:lstStyle/>
           <a:p>
             <a:pPr algn="ctr"/>
-            <a:endParaRPr lang="en-US"/>
+            <a:endParaRPr lang="en-US" sz="1801"/>
           </a:p>
         </p:txBody>
       </p:sp>
@@ -8817,8 +8825,8 @@
         </p:nvSpPr>
         <p:spPr>
           <a:xfrm rot="19090921">
-            <a:off x="3135365" y="1799240"/>
-            <a:ext cx="4681133" cy="4472902"/>
+            <a:off x="3135366" y="1799243"/>
+            <a:ext cx="4681132" cy="4472901"/>
           </a:xfrm>
           <a:prstGeom prst="arc">
             <a:avLst>
@@ -8852,7 +8860,7 @@
           <a:lstStyle/>
           <a:p>
             <a:pPr algn="ctr"/>
-            <a:endParaRPr lang="en-US"/>
+            <a:endParaRPr lang="en-US" sz="1801"/>
           </a:p>
         </p:txBody>
       </p:sp>
@@ -8870,7 +8878,7 @@
         </p:nvSpPr>
         <p:spPr>
           <a:xfrm>
-            <a:off x="3547404" y="497466"/>
+            <a:off x="3547405" y="497466"/>
             <a:ext cx="4152894" cy="3989076"/>
           </a:xfrm>
           <a:prstGeom prst="ellipse">
@@ -8904,7 +8912,7 @@
           <a:lstStyle/>
           <a:p>
             <a:pPr algn="ctr"/>
-            <a:endParaRPr lang="en-US"/>
+            <a:endParaRPr lang="en-US" sz="1801"/>
           </a:p>
         </p:txBody>
       </p:sp>
@@ -8912,6 +8920,343 @@
     <p:extLst>
       <p:ext uri="{BB962C8B-B14F-4D97-AF65-F5344CB8AC3E}">
         <p14:creationId xmlns:p14="http://schemas.microsoft.com/office/powerpoint/2010/main" val="2107820112"/>
+      </p:ext>
+    </p:extLst>
+  </p:cSld>
+  <p:clrMapOvr>
+    <a:masterClrMapping/>
+  </p:clrMapOvr>
+</p:sld>
+</file>
+
+<file path=ppt/slides/slide7.xml><?xml version="1.0" encoding="utf-8"?>
+<p:sld xmlns:a="http://schemas.openxmlformats.org/drawingml/2006/main" xmlns:r="http://schemas.openxmlformats.org/officeDocument/2006/relationships" xmlns:p="http://schemas.openxmlformats.org/presentationml/2006/main">
+  <p:cSld>
+    <p:bg>
+      <p:bgPr>
+        <a:solidFill>
+          <a:schemeClr val="tx1">
+            <a:lumMod val="50000"/>
+            <a:lumOff val="50000"/>
+          </a:schemeClr>
+        </a:solidFill>
+        <a:effectLst/>
+      </p:bgPr>
+    </p:bg>
+    <p:spTree>
+      <p:nvGrpSpPr>
+        <p:cNvPr id="1" name=""/>
+        <p:cNvGrpSpPr/>
+        <p:nvPr/>
+      </p:nvGrpSpPr>
+      <p:grpSpPr>
+        <a:xfrm>
+          <a:off x="0" y="0"/>
+          <a:ext cx="0" cy="0"/>
+          <a:chOff x="0" y="0"/>
+          <a:chExt cx="0" cy="0"/>
+        </a:xfrm>
+      </p:grpSpPr>
+      <p:sp>
+        <p:nvSpPr>
+          <p:cNvPr id="2" name="TextBox 1">
+            <a:extLst>
+              <a:ext uri="{FF2B5EF4-FFF2-40B4-BE49-F238E27FC236}">
+                <a16:creationId xmlns:a16="http://schemas.microsoft.com/office/drawing/2014/main" id="{36913F2B-A3A8-5889-A920-D2778D63C1BA}"/>
+              </a:ext>
+            </a:extLst>
+          </p:cNvPr>
+          <p:cNvSpPr txBox="1"/>
+          <p:nvPr/>
+        </p:nvSpPr>
+        <p:spPr>
+          <a:xfrm>
+            <a:off x="11949626" y="6488668"/>
+            <a:ext cx="187872" cy="107722"/>
+          </a:xfrm>
+          <a:prstGeom prst="rect">
+            <a:avLst/>
+          </a:prstGeom>
+          <a:noFill/>
+        </p:spPr>
+        <p:txBody>
+          <a:bodyPr wrap="none" rtlCol="0">
+            <a:spAutoFit/>
+          </a:bodyPr>
+          <a:lstStyle/>
+          <a:p>
+            <a:r>
+              <a:rPr lang="en-US" sz="100" dirty="0"/>
+              <a:t>.</a:t>
+            </a:r>
+            <a:endParaRPr lang="en-US" sz="800" dirty="0"/>
+          </a:p>
+        </p:txBody>
+      </p:sp>
+      <p:pic>
+        <p:nvPicPr>
+          <p:cNvPr id="4" name="Picture 3">
+            <a:extLst>
+              <a:ext uri="{FF2B5EF4-FFF2-40B4-BE49-F238E27FC236}">
+                <a16:creationId xmlns:a16="http://schemas.microsoft.com/office/drawing/2014/main" id="{8CB23810-B3DC-C82A-5841-08EDBAFD02BF}"/>
+              </a:ext>
+            </a:extLst>
+          </p:cNvPr>
+          <p:cNvPicPr>
+            <a:picLocks noChangeAspect="1"/>
+          </p:cNvPicPr>
+          <p:nvPr/>
+        </p:nvPicPr>
+        <p:blipFill>
+          <a:blip r:embed="rId2">
+            <a:extLst>
+              <a:ext uri="{28A0092B-C50C-407E-A947-70E740481C1C}">
+                <a14:useLocalDpi xmlns:a14="http://schemas.microsoft.com/office/drawing/2010/main" val="0"/>
+              </a:ext>
+            </a:extLst>
+          </a:blip>
+          <a:srcRect/>
+          <a:stretch/>
+        </p:blipFill>
+        <p:spPr>
+          <a:xfrm>
+            <a:off x="0" y="0"/>
+            <a:ext cx="5088253" cy="4620965"/>
+          </a:xfrm>
+          <a:prstGeom prst="rect">
+            <a:avLst/>
+          </a:prstGeom>
+        </p:spPr>
+      </p:pic>
+    </p:spTree>
+    <p:extLst>
+      <p:ext uri="{BB962C8B-B14F-4D97-AF65-F5344CB8AC3E}">
+        <p14:creationId xmlns:p14="http://schemas.microsoft.com/office/powerpoint/2010/main" val="4135986672"/>
+      </p:ext>
+    </p:extLst>
+  </p:cSld>
+  <p:clrMapOvr>
+    <a:masterClrMapping/>
+  </p:clrMapOvr>
+</p:sld>
+</file>
+
+<file path=ppt/slides/slide8.xml><?xml version="1.0" encoding="utf-8"?>
+<p:sld xmlns:a="http://schemas.openxmlformats.org/drawingml/2006/main" xmlns:r="http://schemas.openxmlformats.org/officeDocument/2006/relationships" xmlns:p="http://schemas.openxmlformats.org/presentationml/2006/main">
+  <p:cSld>
+    <p:bg>
+      <p:bgPr>
+        <a:solidFill>
+          <a:schemeClr val="tx1">
+            <a:lumMod val="50000"/>
+            <a:lumOff val="50000"/>
+          </a:schemeClr>
+        </a:solidFill>
+        <a:effectLst/>
+      </p:bgPr>
+    </p:bg>
+    <p:spTree>
+      <p:nvGrpSpPr>
+        <p:cNvPr id="1" name=""/>
+        <p:cNvGrpSpPr/>
+        <p:nvPr/>
+      </p:nvGrpSpPr>
+      <p:grpSpPr>
+        <a:xfrm>
+          <a:off x="0" y="0"/>
+          <a:ext cx="0" cy="0"/>
+          <a:chOff x="0" y="0"/>
+          <a:chExt cx="0" cy="0"/>
+        </a:xfrm>
+      </p:grpSpPr>
+      <p:pic>
+        <p:nvPicPr>
+          <p:cNvPr id="3" name="Picture 2">
+            <a:extLst>
+              <a:ext uri="{FF2B5EF4-FFF2-40B4-BE49-F238E27FC236}">
+                <a16:creationId xmlns:a16="http://schemas.microsoft.com/office/drawing/2014/main" id="{1670B992-7809-65AC-579D-23DADE2F4454}"/>
+              </a:ext>
+            </a:extLst>
+          </p:cNvPr>
+          <p:cNvPicPr>
+            <a:picLocks noChangeAspect="1"/>
+          </p:cNvPicPr>
+          <p:nvPr/>
+        </p:nvPicPr>
+        <p:blipFill>
+          <a:blip r:embed="rId2">
+            <a:extLst>
+              <a:ext uri="{28A0092B-C50C-407E-A947-70E740481C1C}">
+                <a14:useLocalDpi xmlns:a14="http://schemas.microsoft.com/office/drawing/2010/main" val="0"/>
+              </a:ext>
+            </a:extLst>
+          </a:blip>
+          <a:srcRect/>
+          <a:stretch/>
+        </p:blipFill>
+        <p:spPr>
+          <a:xfrm>
+            <a:off x="0" y="0"/>
+            <a:ext cx="5088254" cy="4620965"/>
+          </a:xfrm>
+          <a:prstGeom prst="rect">
+            <a:avLst/>
+          </a:prstGeom>
+        </p:spPr>
+      </p:pic>
+      <p:sp>
+        <p:nvSpPr>
+          <p:cNvPr id="4" name="TextBox 3">
+            <a:extLst>
+              <a:ext uri="{FF2B5EF4-FFF2-40B4-BE49-F238E27FC236}">
+                <a16:creationId xmlns:a16="http://schemas.microsoft.com/office/drawing/2014/main" id="{20E98A7E-F328-C58F-D1A0-701C7A25940D}"/>
+              </a:ext>
+            </a:extLst>
+          </p:cNvPr>
+          <p:cNvSpPr txBox="1"/>
+          <p:nvPr/>
+        </p:nvSpPr>
+        <p:spPr>
+          <a:xfrm>
+            <a:off x="11949626" y="6488668"/>
+            <a:ext cx="187872" cy="107722"/>
+          </a:xfrm>
+          <a:prstGeom prst="rect">
+            <a:avLst/>
+          </a:prstGeom>
+          <a:noFill/>
+        </p:spPr>
+        <p:txBody>
+          <a:bodyPr wrap="none" rtlCol="0">
+            <a:spAutoFit/>
+          </a:bodyPr>
+          <a:lstStyle/>
+          <a:p>
+            <a:r>
+              <a:rPr lang="en-US" sz="100" dirty="0"/>
+              <a:t>.</a:t>
+            </a:r>
+            <a:endParaRPr lang="en-US" sz="800" dirty="0"/>
+          </a:p>
+        </p:txBody>
+      </p:sp>
+    </p:spTree>
+    <p:extLst>
+      <p:ext uri="{BB962C8B-B14F-4D97-AF65-F5344CB8AC3E}">
+        <p14:creationId xmlns:p14="http://schemas.microsoft.com/office/powerpoint/2010/main" val="1494370164"/>
+      </p:ext>
+    </p:extLst>
+  </p:cSld>
+  <p:clrMapOvr>
+    <a:masterClrMapping/>
+  </p:clrMapOvr>
+</p:sld>
+</file>
+
+<file path=ppt/slides/slide9.xml><?xml version="1.0" encoding="utf-8"?>
+<p:sld xmlns:a="http://schemas.openxmlformats.org/drawingml/2006/main" xmlns:r="http://schemas.openxmlformats.org/officeDocument/2006/relationships" xmlns:p="http://schemas.openxmlformats.org/presentationml/2006/main">
+  <p:cSld>
+    <p:bg>
+      <p:bgPr>
+        <a:solidFill>
+          <a:schemeClr val="tx1">
+            <a:lumMod val="50000"/>
+            <a:lumOff val="50000"/>
+          </a:schemeClr>
+        </a:solidFill>
+        <a:effectLst/>
+      </p:bgPr>
+    </p:bg>
+    <p:spTree>
+      <p:nvGrpSpPr>
+        <p:cNvPr id="1" name=""/>
+        <p:cNvGrpSpPr/>
+        <p:nvPr/>
+      </p:nvGrpSpPr>
+      <p:grpSpPr>
+        <a:xfrm>
+          <a:off x="0" y="0"/>
+          <a:ext cx="0" cy="0"/>
+          <a:chOff x="0" y="0"/>
+          <a:chExt cx="0" cy="0"/>
+        </a:xfrm>
+      </p:grpSpPr>
+      <p:pic>
+        <p:nvPicPr>
+          <p:cNvPr id="3" name="Picture 2" descr="A white ship with a green circle around it&#10;&#10;Description automatically generated">
+            <a:extLst>
+              <a:ext uri="{FF2B5EF4-FFF2-40B4-BE49-F238E27FC236}">
+                <a16:creationId xmlns:a16="http://schemas.microsoft.com/office/drawing/2014/main" id="{D935AFEF-BCF7-3FBB-9C87-15953A8265CA}"/>
+              </a:ext>
+            </a:extLst>
+          </p:cNvPr>
+          <p:cNvPicPr>
+            <a:picLocks noChangeAspect="1"/>
+          </p:cNvPicPr>
+          <p:nvPr/>
+        </p:nvPicPr>
+        <p:blipFill>
+          <a:blip r:embed="rId2">
+            <a:extLst>
+              <a:ext uri="{28A0092B-C50C-407E-A947-70E740481C1C}">
+                <a14:useLocalDpi xmlns:a14="http://schemas.microsoft.com/office/drawing/2010/main" val="0"/>
+              </a:ext>
+            </a:extLst>
+          </a:blip>
+          <a:stretch>
+            <a:fillRect/>
+          </a:stretch>
+        </p:blipFill>
+        <p:spPr>
+          <a:xfrm>
+            <a:off x="0" y="0"/>
+            <a:ext cx="5088254" cy="4620966"/>
+          </a:xfrm>
+          <a:prstGeom prst="rect">
+            <a:avLst/>
+          </a:prstGeom>
+        </p:spPr>
+      </p:pic>
+      <p:sp>
+        <p:nvSpPr>
+          <p:cNvPr id="5" name="TextBox 4">
+            <a:extLst>
+              <a:ext uri="{FF2B5EF4-FFF2-40B4-BE49-F238E27FC236}">
+                <a16:creationId xmlns:a16="http://schemas.microsoft.com/office/drawing/2014/main" id="{EF70F5B1-EF7D-7E5B-785E-64B0F7C73439}"/>
+              </a:ext>
+            </a:extLst>
+          </p:cNvPr>
+          <p:cNvSpPr txBox="1"/>
+          <p:nvPr/>
+        </p:nvSpPr>
+        <p:spPr>
+          <a:xfrm>
+            <a:off x="11949626" y="6488668"/>
+            <a:ext cx="187872" cy="107722"/>
+          </a:xfrm>
+          <a:prstGeom prst="rect">
+            <a:avLst/>
+          </a:prstGeom>
+          <a:noFill/>
+        </p:spPr>
+        <p:txBody>
+          <a:bodyPr wrap="none" rtlCol="0">
+            <a:spAutoFit/>
+          </a:bodyPr>
+          <a:lstStyle/>
+          <a:p>
+            <a:r>
+              <a:rPr lang="en-US" sz="100" dirty="0"/>
+              <a:t>.</a:t>
+            </a:r>
+            <a:endParaRPr lang="en-US" sz="800" dirty="0"/>
+          </a:p>
+        </p:txBody>
+      </p:sp>
+    </p:spTree>
+    <p:extLst>
+      <p:ext uri="{BB962C8B-B14F-4D97-AF65-F5344CB8AC3E}">
+        <p14:creationId xmlns:p14="http://schemas.microsoft.com/office/powerpoint/2010/main" val="2530760764"/>
       </p:ext>
     </p:extLst>
   </p:cSld>

</xml_diff>